<commit_message>
Added homeworks as README's
</commit_message>
<xml_diff>
--- a/02. ASP.NET-MVC-Essentials/ASP.NET MVC Essentials.pptx
+++ b/02. ASP.NET-MVC-Essentials/ASP.NET MVC Essentials.pptx
@@ -5,10 +5,10 @@
     <p:sldMasterId id="2147483672" r:id="rId1"/>
   </p:sldMasterIdLst>
   <p:notesMasterIdLst>
-    <p:notesMasterId r:id="rId55"/>
+    <p:notesMasterId r:id="rId54"/>
   </p:notesMasterIdLst>
   <p:handoutMasterIdLst>
-    <p:handoutMasterId r:id="rId56"/>
+    <p:handoutMasterId r:id="rId55"/>
   </p:handoutMasterIdLst>
   <p:sldIdLst>
     <p:sldId id="338" r:id="rId2"/>
@@ -62,13 +62,12 @@
     <p:sldId id="436" r:id="rId50"/>
     <p:sldId id="370" r:id="rId51"/>
     <p:sldId id="334" r:id="rId52"/>
-    <p:sldId id="449" r:id="rId53"/>
-    <p:sldId id="403" r:id="rId54"/>
+    <p:sldId id="403" r:id="rId53"/>
   </p:sldIdLst>
   <p:sldSz cx="9144000" cy="6858000" type="screen4x3"/>
   <p:notesSz cx="6881813" cy="9296400"/>
   <p:custDataLst>
-    <p:tags r:id="rId57"/>
+    <p:tags r:id="rId56"/>
   </p:custDataLst>
   <p:defaultTextStyle>
     <a:defPPr>
@@ -271,14 +270,13 @@
           <p14:sldIdLst>
             <p14:sldId id="370"/>
             <p14:sldId id="334"/>
-            <p14:sldId id="449"/>
             <p14:sldId id="403"/>
           </p14:sldIdLst>
         </p14:section>
       </p14:sectionLst>
     </p:ext>
     <p:ext uri="{EFAFB233-063F-42B5-8137-9DF3F51BA10A}">
-      <p15:sldGuideLst xmlns:p15="http://schemas.microsoft.com/office/powerpoint/2012/main" xmlns="">
+      <p15:sldGuideLst xmlns:p15="http://schemas.microsoft.com/office/powerpoint/2012/main">
         <p15:guide id="1" orient="horz" pos="2160">
           <p15:clr>
             <a:srgbClr val="A4A3A4"/>
@@ -292,7 +290,7 @@
       </p15:sldGuideLst>
     </p:ext>
     <p:ext uri="{2D200454-40CA-4A62-9FC3-DE9A4176ACB9}">
-      <p15:notesGuideLst xmlns:p15="http://schemas.microsoft.com/office/powerpoint/2012/main" xmlns="">
+      <p15:notesGuideLst xmlns:p15="http://schemas.microsoft.com/office/powerpoint/2012/main">
         <p15:guide id="1" orient="horz" pos="2928">
           <p15:clr>
             <a:srgbClr val="A4A3A4"/>
@@ -424,7 +422,7 @@
             <a:fld id="{3BF7C7B5-275F-4D1F-9AB4-9255447DBC73}" type="datetimeFigureOut">
               <a:rPr lang="en-US"/>
               <a:pPr/>
-              <a:t>11/3/2014</a:t>
+              <a:t>2/1/2016</a:t>
             </a:fld>
             <a:endParaRPr lang="en-US" dirty="0"/>
           </a:p>
@@ -655,7 +653,7 @@
             <a:fld id="{9B46F231-FB2B-4655-A644-E2477325E686}" type="datetimeFigureOut">
               <a:rPr lang="en-US"/>
               <a:pPr/>
-              <a:t>11/3/2014</a:t>
+              <a:t>2/1/2016</a:t>
             </a:fld>
             <a:endParaRPr lang="en-US" dirty="0"/>
           </a:p>
@@ -1159,146 +1157,6 @@
     <p:extLst>
       <p:ext uri="{BB962C8B-B14F-4D97-AF65-F5344CB8AC3E}">
         <p14:creationId xmlns:p14="http://schemas.microsoft.com/office/powerpoint/2010/main" val="3636243312"/>
-      </p:ext>
-    </p:extLst>
-  </p:cSld>
-  <p:clrMapOvr>
-    <a:masterClrMapping/>
-  </p:clrMapOvr>
-</p:notes>
-</file>
-
-<file path=ppt/notesSlides/notesSlide3.xml><?xml version="1.0" encoding="utf-8"?>
-<p:notes xmlns:a="http://schemas.openxmlformats.org/drawingml/2006/main" xmlns:r="http://schemas.openxmlformats.org/officeDocument/2006/relationships" xmlns:p="http://schemas.openxmlformats.org/presentationml/2006/main">
-  <p:cSld>
-    <p:spTree>
-      <p:nvGrpSpPr>
-        <p:cNvPr id="1" name=""/>
-        <p:cNvGrpSpPr/>
-        <p:nvPr/>
-      </p:nvGrpSpPr>
-      <p:grpSpPr>
-        <a:xfrm>
-          <a:off x="0" y="0"/>
-          <a:ext cx="0" cy="0"/>
-          <a:chOff x="0" y="0"/>
-          <a:chExt cx="0" cy="0"/>
-        </a:xfrm>
-      </p:grpSpPr>
-      <p:sp>
-        <p:nvSpPr>
-          <p:cNvPr id="4" name="Rectangle 2"/>
-          <p:cNvSpPr>
-            <a:spLocks noGrp="1" noChangeArrowheads="1"/>
-          </p:cNvSpPr>
-          <p:nvPr>
-            <p:ph type="hdr" sz="quarter"/>
-          </p:nvPr>
-        </p:nvSpPr>
-        <p:spPr>
-          <a:ln/>
-        </p:spPr>
-        <p:txBody>
-          <a:bodyPr/>
-          <a:lstStyle/>
-          <a:p>
-            <a:r>
-              <a:rPr lang="en-US" dirty="0"/>
-              <a:t>*</a:t>
-            </a:r>
-          </a:p>
-        </p:txBody>
-      </p:sp>
-      <p:sp>
-        <p:nvSpPr>
-          <p:cNvPr id="5" name="Rectangle 6"/>
-          <p:cNvSpPr>
-            <a:spLocks noGrp="1" noChangeArrowheads="1"/>
-          </p:cNvSpPr>
-          <p:nvPr>
-            <p:ph type="ftr" sz="quarter" idx="4"/>
-          </p:nvPr>
-        </p:nvSpPr>
-        <p:spPr>
-          <a:ln/>
-        </p:spPr>
-        <p:txBody>
-          <a:bodyPr/>
-          <a:lstStyle/>
-          <a:p>
-            <a:r>
-              <a:rPr lang="en-US" dirty="0"/>
-              <a:t>(c) 2008 National Academy for Software Development - http://academy.devbg.org. All rights reserved. Unauthorized copying or re-distribution is strictly prohibited.*</a:t>
-            </a:r>
-          </a:p>
-        </p:txBody>
-      </p:sp>
-      <p:sp>
-        <p:nvSpPr>
-          <p:cNvPr id="6" name="Rectangle 7"/>
-          <p:cNvSpPr>
-            <a:spLocks noGrp="1" noChangeArrowheads="1"/>
-          </p:cNvSpPr>
-          <p:nvPr>
-            <p:ph type="sldNum" sz="quarter" idx="5"/>
-          </p:nvPr>
-        </p:nvSpPr>
-        <p:spPr>
-          <a:ln/>
-        </p:spPr>
-        <p:txBody>
-          <a:bodyPr/>
-          <a:lstStyle/>
-          <a:p>
-            <a:fld id="{7E89B841-8A48-48DC-813C-151166E312BA}" type="slidenum">
-              <a:rPr lang="en-US"/>
-              <a:pPr/>
-              <a:t>52</a:t>
-            </a:fld>
-            <a:r>
-              <a:rPr lang="en-US" dirty="0"/>
-              <a:t>##</a:t>
-            </a:r>
-          </a:p>
-        </p:txBody>
-      </p:sp>
-      <p:sp>
-        <p:nvSpPr>
-          <p:cNvPr id="545794" name="Rectangle 2"/>
-          <p:cNvSpPr>
-            <a:spLocks noGrp="1" noRot="1" noChangeAspect="1" noChangeArrowheads="1" noTextEdit="1"/>
-          </p:cNvSpPr>
-          <p:nvPr>
-            <p:ph type="sldImg"/>
-          </p:nvPr>
-        </p:nvSpPr>
-        <p:spPr>
-          <a:ln/>
-        </p:spPr>
-      </p:sp>
-      <p:sp>
-        <p:nvSpPr>
-          <p:cNvPr id="545795" name="Rectangle 3"/>
-          <p:cNvSpPr>
-            <a:spLocks noGrp="1" noChangeArrowheads="1"/>
-          </p:cNvSpPr>
-          <p:nvPr>
-            <p:ph type="body" idx="1"/>
-          </p:nvPr>
-        </p:nvSpPr>
-        <p:spPr/>
-        <p:txBody>
-          <a:bodyPr/>
-          <a:lstStyle/>
-          <a:p>
-            <a:endParaRPr lang="bg-BG"/>
-          </a:p>
-        </p:txBody>
-      </p:sp>
-    </p:spTree>
-    <p:extLst>
-      <p:ext uri="{BB962C8B-B14F-4D97-AF65-F5344CB8AC3E}">
-        <p14:creationId xmlns:p14="http://schemas.microsoft.com/office/powerpoint/2010/main" val="199625071"/>
       </p:ext>
     </p:extLst>
   </p:cSld>
@@ -28634,273 +28492,6 @@
 </file>
 
 <file path=ppt/slides/slide52.xml><?xml version="1.0" encoding="utf-8"?>
-<p:sld xmlns:a="http://schemas.openxmlformats.org/drawingml/2006/main" xmlns:r="http://schemas.openxmlformats.org/officeDocument/2006/relationships" xmlns:p="http://schemas.openxmlformats.org/presentationml/2006/main" show="0">
-  <p:cSld>
-    <p:spTree>
-      <p:nvGrpSpPr>
-        <p:cNvPr id="1" name=""/>
-        <p:cNvGrpSpPr/>
-        <p:nvPr/>
-      </p:nvGrpSpPr>
-      <p:grpSpPr>
-        <a:xfrm>
-          <a:off x="0" y="0"/>
-          <a:ext cx="0" cy="0"/>
-          <a:chOff x="0" y="0"/>
-          <a:chExt cx="0" cy="0"/>
-        </a:xfrm>
-      </p:grpSpPr>
-      <p:sp>
-        <p:nvSpPr>
-          <p:cNvPr id="544770" name="Rectangle 2"/>
-          <p:cNvSpPr>
-            <a:spLocks noGrp="1" noChangeArrowheads="1"/>
-          </p:cNvSpPr>
-          <p:nvPr>
-            <p:ph type="title"/>
-          </p:nvPr>
-        </p:nvSpPr>
-        <p:spPr/>
-        <p:txBody>
-          <a:bodyPr/>
-          <a:lstStyle/>
-          <a:p>
-            <a:r>
-              <a:rPr lang="en-US" dirty="0" smtClean="0"/>
-              <a:t>Homework</a:t>
-            </a:r>
-            <a:endParaRPr lang="bg-BG" dirty="0"/>
-          </a:p>
-        </p:txBody>
-      </p:sp>
-      <p:sp>
-        <p:nvSpPr>
-          <p:cNvPr id="544771" name="Rectangle 3"/>
-          <p:cNvSpPr>
-            <a:spLocks noGrp="1" noChangeArrowheads="1"/>
-          </p:cNvSpPr>
-          <p:nvPr>
-            <p:ph idx="1"/>
-          </p:nvPr>
-        </p:nvSpPr>
-        <p:spPr>
-          <a:xfrm>
-            <a:off x="228600" y="722012"/>
-            <a:ext cx="8686800" cy="5983588"/>
-          </a:xfrm>
-        </p:spPr>
-        <p:txBody>
-          <a:bodyPr/>
-          <a:lstStyle/>
-          <a:p>
-            <a:pPr marL="446088" indent="-446088">
-              <a:lnSpc>
-                <a:spcPts val="3700"/>
-              </a:lnSpc>
-              <a:spcBef>
-                <a:spcPts val="300"/>
-              </a:spcBef>
-              <a:spcAft>
-                <a:spcPts val="300"/>
-              </a:spcAft>
-              <a:buFontTx/>
-              <a:buAutoNum type="arabicPeriod"/>
-              <a:tabLst/>
-            </a:pPr>
-            <a:r>
-              <a:rPr lang="en-US" sz="2800" dirty="0"/>
-              <a:t>Write down </a:t>
-            </a:r>
-            <a:r>
-              <a:rPr lang="en-US" sz="2800" dirty="0" smtClean="0"/>
-              <a:t>in a text file all </a:t>
-            </a:r>
-            <a:r>
-              <a:rPr lang="en-US" sz="2800" dirty="0"/>
-              <a:t>the major </a:t>
-            </a:r>
-            <a:r>
-              <a:rPr lang="en-US" sz="2800" dirty="0" smtClean="0"/>
-              <a:t>similarities and </a:t>
-            </a:r>
-            <a:r>
-              <a:rPr lang="en-US" sz="2800" dirty="0"/>
-              <a:t>differences you can find </a:t>
-            </a:r>
-            <a:r>
-              <a:rPr lang="en-US" sz="2800" dirty="0" smtClean="0"/>
-              <a:t>between ASP.NET </a:t>
-            </a:r>
-            <a:r>
-              <a:rPr lang="en-US" sz="2800" dirty="0"/>
-              <a:t>Web Forms and ASP.NET MVC</a:t>
-            </a:r>
-          </a:p>
-          <a:p>
-            <a:pPr marL="446088" indent="-446088">
-              <a:lnSpc>
-                <a:spcPts val="3700"/>
-              </a:lnSpc>
-              <a:spcBef>
-                <a:spcPts val="300"/>
-              </a:spcBef>
-              <a:spcAft>
-                <a:spcPts val="300"/>
-              </a:spcAft>
-              <a:buFontTx/>
-              <a:buAutoNum type="arabicPeriod"/>
-              <a:tabLst/>
-            </a:pPr>
-            <a:r>
-              <a:rPr lang="en-US" sz="2800" dirty="0" smtClean="0"/>
-              <a:t>Using ASP.NET MVC write </a:t>
-            </a:r>
-            <a:r>
-              <a:rPr lang="en-US" sz="2800" dirty="0"/>
-              <a:t>t</a:t>
-            </a:r>
-            <a:r>
-              <a:rPr lang="en-US" sz="2800" dirty="0" smtClean="0"/>
-              <a:t>he </a:t>
-            </a:r>
-            <a:r>
-              <a:rPr lang="en-US" sz="2800" dirty="0"/>
-              <a:t>same web </a:t>
-            </a:r>
-            <a:r>
-              <a:rPr lang="en-US" sz="2800" dirty="0" smtClean="0"/>
-              <a:t>calculator as: </a:t>
-            </a:r>
-            <a:r>
-              <a:rPr lang="en-US" sz="2800" dirty="0" smtClean="0">
-                <a:hlinkClick r:id="rId3"/>
-              </a:rPr>
-              <a:t>http</a:t>
-            </a:r>
-            <a:r>
-              <a:rPr lang="en-US" sz="2800" dirty="0">
-                <a:hlinkClick r:id="rId3"/>
-              </a:rPr>
-              <a:t>://</a:t>
-            </a:r>
-            <a:r>
-              <a:rPr lang="en-US" sz="2800" dirty="0" smtClean="0">
-                <a:hlinkClick r:id="rId3"/>
-              </a:rPr>
-              <a:t>www.gwebtools.com/bit-calculator</a:t>
-            </a:r>
-            <a:endParaRPr lang="en-US" sz="2800" dirty="0" smtClean="0"/>
-          </a:p>
-          <a:p>
-            <a:pPr marL="446088" indent="-446088">
-              <a:lnSpc>
-                <a:spcPts val="3700"/>
-              </a:lnSpc>
-              <a:spcBef>
-                <a:spcPts val="300"/>
-              </a:spcBef>
-              <a:spcAft>
-                <a:spcPts val="300"/>
-              </a:spcAft>
-              <a:buFontTx/>
-              <a:buAutoNum type="arabicPeriod"/>
-              <a:tabLst/>
-            </a:pPr>
-            <a:r>
-              <a:rPr lang="en-US" sz="2800" dirty="0" smtClean="0"/>
-              <a:t>Create a simple informational ASP.NET MVC application by your choice with at least 3 controllers, 1 area, 1 custom route, 5 </a:t>
-            </a:r>
-            <a:r>
-              <a:rPr lang="en-US" sz="2800" dirty="0"/>
-              <a:t>views (at least 1 </a:t>
-            </a:r>
-            <a:r>
-              <a:rPr lang="en-US" sz="2800" dirty="0" smtClean="0"/>
-              <a:t>partial view and 1 section). Using data is not required.</a:t>
-            </a:r>
-          </a:p>
-          <a:p>
-            <a:pPr marL="446088" indent="-446088">
-              <a:lnSpc>
-                <a:spcPts val="3700"/>
-              </a:lnSpc>
-              <a:spcBef>
-                <a:spcPts val="300"/>
-              </a:spcBef>
-              <a:spcAft>
-                <a:spcPts val="300"/>
-              </a:spcAft>
-              <a:buFontTx/>
-              <a:buAutoNum type="arabicPeriod"/>
-              <a:tabLst/>
-            </a:pPr>
-            <a:r>
-              <a:rPr lang="en-US" sz="2800" dirty="0" smtClean="0"/>
-              <a:t>* Create a custom route constraint that allows requests only if the controller name start</a:t>
-            </a:r>
-            <a:r>
-              <a:rPr lang="en-US" sz="2800" dirty="0"/>
-              <a:t>s</a:t>
-            </a:r>
-            <a:r>
-              <a:rPr lang="en-US" sz="2800" dirty="0" smtClean="0"/>
-              <a:t> with the string "Admin"</a:t>
-            </a:r>
-            <a:endParaRPr lang="en-US" sz="2800" dirty="0"/>
-          </a:p>
-        </p:txBody>
-      </p:sp>
-      <p:sp>
-        <p:nvSpPr>
-          <p:cNvPr id="4" name="Slide Number Placeholder 3"/>
-          <p:cNvSpPr>
-            <a:spLocks noGrp="1"/>
-          </p:cNvSpPr>
-          <p:nvPr>
-            <p:ph type="sldNum" sz="quarter" idx="10"/>
-          </p:nvPr>
-        </p:nvSpPr>
-        <p:spPr/>
-        <p:txBody>
-          <a:bodyPr/>
-          <a:lstStyle/>
-          <a:p>
-            <a:pPr>
-              <a:defRPr/>
-            </a:pPr>
-            <a:fld id="{58452FF4-89E3-4D1B-9927-2DBDC00E58D7}" type="slidenum">
-              <a:rPr lang="en-US" smtClean="0"/>
-              <a:pPr>
-                <a:defRPr/>
-              </a:pPr>
-              <a:t>52</a:t>
-            </a:fld>
-            <a:endParaRPr lang="en-US" dirty="0"/>
-          </a:p>
-        </p:txBody>
-      </p:sp>
-    </p:spTree>
-    <p:extLst>
-      <p:ext uri="{BB962C8B-B14F-4D97-AF65-F5344CB8AC3E}">
-        <p14:creationId xmlns:p14="http://schemas.microsoft.com/office/powerpoint/2010/main" val="3218241134"/>
-      </p:ext>
-    </p:extLst>
-  </p:cSld>
-  <p:clrMapOvr>
-    <a:masterClrMapping/>
-  </p:clrMapOvr>
-  <p:transition/>
-  <p:timing>
-    <p:tnLst>
-      <p:par>
-        <p:cTn id="1" dur="indefinite" restart="never" nodeType="tmRoot"/>
-      </p:par>
-    </p:tnLst>
-  </p:timing>
-</p:sld>
-</file>
-
-<file path=ppt/slides/slide53.xml><?xml version="1.0" encoding="utf-8"?>
 <p:sld xmlns:a="http://schemas.openxmlformats.org/drawingml/2006/main" xmlns:r="http://schemas.openxmlformats.org/officeDocument/2006/relationships" xmlns:p="http://schemas.openxmlformats.org/presentationml/2006/main">
   <p:cSld>
     <p:spTree>
@@ -29363,7 +28954,7 @@
               <a:pPr>
                 <a:defRPr/>
               </a:pPr>
-              <a:t>53</a:t>
+              <a:t>52</a:t>
             </a:fld>
             <a:endParaRPr lang="en-US" dirty="0"/>
           </a:p>

</xml_diff>

<commit_message>
Improvements in ASP.NET MVC Essentials.pptx
</commit_message>
<xml_diff>
--- a/02. ASP.NET-MVC-Essentials/ASP.NET MVC Essentials.pptx
+++ b/02. ASP.NET-MVC-Essentials/ASP.NET MVC Essentials.pptx
@@ -266,7 +266,7 @@
             <p14:sldId id="436"/>
           </p14:sldIdLst>
         </p14:section>
-        <p14:section name="Summary, Questions, Homework" id="{BF8BA706-AE01-4B32-9077-3FC7844D949C}">
+        <p14:section name="Summary and Questions" id="{BF8BA706-AE01-4B32-9077-3FC7844D949C}">
           <p14:sldIdLst>
             <p14:sldId id="370"/>
             <p14:sldId id="334"/>
@@ -11008,7 +11008,7 @@
           <p:nvPr>
             <p:extLst>
               <p:ext uri="{D42A27DB-BD31-4B8C-83A1-F6EECF244321}">
-                <p14:modId xmlns:p14="http://schemas.microsoft.com/office/powerpoint/2010/main" val="1653863045"/>
+                <p14:modId xmlns:p14="http://schemas.microsoft.com/office/powerpoint/2010/main" val="709729140"/>
               </p:ext>
             </p:extLst>
           </p:nvPr>
@@ -11182,7 +11182,7 @@
                         <a:defRPr/>
                       </a:pPr>
                       <a:r>
-                        <a:rPr lang="en-US" sz="1800" b="0" i="0" u="none" strike="noStrike" kern="1200" baseline="0" dirty="0" err="1" smtClean="0">
+                        <a:rPr lang="en-US" sz="1800" b="1" i="0" u="none" strike="noStrike" kern="1200" baseline="0" dirty="0" err="1" smtClean="0">
                           <a:solidFill>
                             <a:schemeClr val="dk1"/>
                           </a:solidFill>
@@ -11192,7 +11192,7 @@
                         </a:rPr>
                         <a:t>ContentResult</a:t>
                       </a:r>
-                      <a:endParaRPr lang="en-US" sz="1800" b="0" i="0" u="none" strike="noStrike" kern="1200" baseline="0" dirty="0" smtClean="0">
+                      <a:endParaRPr lang="en-US" sz="1800" b="1" i="0" u="none" strike="noStrike" kern="1200" baseline="0" dirty="0" smtClean="0">
                         <a:solidFill>
                           <a:schemeClr val="dk1"/>
                         </a:solidFill>
@@ -11303,7 +11303,7 @@
                         <a:defRPr/>
                       </a:pPr>
                       <a:r>
-                        <a:rPr lang="en-US" sz="1800" b="0" i="0" u="none" strike="noStrike" kern="1200" baseline="0" dirty="0" err="1" smtClean="0">
+                        <a:rPr lang="en-US" sz="1800" b="1" i="0" u="none" strike="noStrike" kern="1200" baseline="0" dirty="0" err="1" smtClean="0">
                           <a:solidFill>
                             <a:schemeClr val="dk1"/>
                           </a:solidFill>
@@ -11313,7 +11313,7 @@
                         </a:rPr>
                         <a:t>EmptyResult</a:t>
                       </a:r>
-                      <a:endParaRPr lang="en-US" sz="1800" b="0" i="0" u="none" strike="noStrike" kern="1200" baseline="0" dirty="0" smtClean="0">
+                      <a:endParaRPr lang="en-US" sz="1800" b="1" i="0" u="none" strike="noStrike" kern="1200" baseline="0" dirty="0" smtClean="0">
                         <a:solidFill>
                           <a:schemeClr val="dk1"/>
                         </a:solidFill>
@@ -11397,7 +11397,7 @@
                         <a:defRPr/>
                       </a:pPr>
                       <a:r>
-                        <a:rPr lang="en-US" sz="1800" b="0" i="0" u="none" strike="noStrike" kern="1200" baseline="0" dirty="0" err="1" smtClean="0">
+                        <a:rPr lang="en-US" sz="1800" b="1" i="0" u="none" strike="noStrike" kern="1200" baseline="0" dirty="0" err="1" smtClean="0">
                           <a:solidFill>
                             <a:schemeClr val="dk1"/>
                           </a:solidFill>
@@ -11407,7 +11407,7 @@
                         </a:rPr>
                         <a:t>FileContentResult</a:t>
                       </a:r>
-                      <a:endParaRPr lang="en-US" sz="1800" b="0" i="0" u="none" strike="noStrike" kern="1200" baseline="0" dirty="0" smtClean="0">
+                      <a:endParaRPr lang="en-US" sz="1800" b="1" i="0" u="none" strike="noStrike" kern="1200" baseline="0" dirty="0" smtClean="0">
                         <a:solidFill>
                           <a:schemeClr val="dk1"/>
                         </a:solidFill>
@@ -11435,7 +11435,7 @@
                         <a:defRPr/>
                       </a:pPr>
                       <a:r>
-                        <a:rPr lang="en-US" sz="1800" b="0" i="0" u="none" strike="noStrike" kern="1200" baseline="0" dirty="0" err="1" smtClean="0">
+                        <a:rPr lang="en-US" sz="1800" b="1" i="0" u="none" strike="noStrike" kern="1200" baseline="0" dirty="0" err="1" smtClean="0">
                           <a:solidFill>
                             <a:schemeClr val="dk1"/>
                           </a:solidFill>
@@ -11445,7 +11445,7 @@
                         </a:rPr>
                         <a:t>FilePathResult</a:t>
                       </a:r>
-                      <a:endParaRPr lang="en-US" sz="1800" b="0" i="0" u="none" strike="noStrike" kern="1200" baseline="0" dirty="0" smtClean="0">
+                      <a:endParaRPr lang="en-US" sz="1800" b="1" i="0" u="none" strike="noStrike" kern="1200" baseline="0" dirty="0" smtClean="0">
                         <a:solidFill>
                           <a:schemeClr val="dk1"/>
                         </a:solidFill>
@@ -11473,7 +11473,7 @@
                         <a:defRPr/>
                       </a:pPr>
                       <a:r>
-                        <a:rPr lang="en-US" sz="1800" b="0" i="0" u="none" strike="noStrike" kern="1200" baseline="0" dirty="0" err="1" smtClean="0">
+                        <a:rPr lang="en-US" sz="1800" b="1" i="0" u="none" strike="noStrike" kern="1200" baseline="0" dirty="0" err="1" smtClean="0">
                           <a:solidFill>
                             <a:schemeClr val="dk1"/>
                           </a:solidFill>
@@ -11483,7 +11483,7 @@
                         </a:rPr>
                         <a:t>FileStreamResult</a:t>
                       </a:r>
-                      <a:endParaRPr lang="en-US" sz="1800" b="0" i="0" u="none" strike="noStrike" kern="1200" baseline="0" dirty="0" smtClean="0">
+                      <a:endParaRPr lang="en-US" sz="1800" b="1" i="0" u="none" strike="noStrike" kern="1200" baseline="0" dirty="0" smtClean="0">
                         <a:solidFill>
                           <a:schemeClr val="dk1"/>
                         </a:solidFill>
@@ -11676,14 +11676,14 @@
           <p:nvPr>
             <p:extLst>
               <p:ext uri="{D42A27DB-BD31-4B8C-83A1-F6EECF244321}">
-                <p14:modId xmlns:p14="http://schemas.microsoft.com/office/powerpoint/2010/main" val="2022181722"/>
+                <p14:modId xmlns:p14="http://schemas.microsoft.com/office/powerpoint/2010/main" val="1143994613"/>
               </p:ext>
             </p:extLst>
           </p:nvPr>
         </p:nvGraphicFramePr>
         <p:xfrm>
-          <a:off x="800100" y="1445895"/>
-          <a:ext cx="7543800" cy="4345305"/>
+          <a:off x="609600" y="1445895"/>
+          <a:ext cx="7734300" cy="4345305"/>
         </p:xfrm>
         <a:graphic>
           <a:graphicData uri="http://schemas.openxmlformats.org/drawingml/2006/table">
@@ -11692,9 +11692,9 @@
                 <a:tableStyleId>{073A0DAA-6AF3-43AB-8588-CEC1D06C72B9}</a:tableStyleId>
               </a:tblPr>
               <a:tblGrid>
-                <a:gridCol w="2514600"/>
-                <a:gridCol w="2819400"/>
-                <a:gridCol w="2209800"/>
+                <a:gridCol w="2667000"/>
+                <a:gridCol w="2801697"/>
+                <a:gridCol w="2265603"/>
               </a:tblGrid>
               <a:tr h="412115">
                 <a:tc>
@@ -11850,7 +11850,7 @@
                         <a:defRPr/>
                       </a:pPr>
                       <a:r>
-                        <a:rPr lang="en-US" sz="1800" b="0" i="0" u="none" strike="noStrike" kern="1200" baseline="0" dirty="0" err="1" smtClean="0">
+                        <a:rPr lang="en-US" sz="1800" b="1" i="0" u="none" strike="noStrike" kern="1200" baseline="0" dirty="0" err="1" smtClean="0">
                           <a:solidFill>
                             <a:schemeClr val="dk1"/>
                           </a:solidFill>
@@ -11861,7 +11861,7 @@
                         <a:t>HttpUnauthorizedResult</a:t>
                       </a:r>
                       <a:r>
-                        <a:rPr lang="en-US" sz="1800" b="0" i="0" u="none" strike="noStrike" kern="1200" baseline="0" dirty="0" smtClean="0">
+                        <a:rPr lang="en-US" sz="1800" b="1" i="0" u="none" strike="noStrike" kern="1200" baseline="0" dirty="0" smtClean="0">
                           <a:solidFill>
                             <a:schemeClr val="dk1"/>
                           </a:solidFill>
@@ -11971,7 +11971,7 @@
                         <a:defRPr/>
                       </a:pPr>
                       <a:r>
-                        <a:rPr lang="en-US" sz="1800" b="0" i="0" u="none" strike="noStrike" kern="1200" baseline="0" dirty="0" err="1" smtClean="0">
+                        <a:rPr lang="en-US" sz="1800" b="1" i="0" u="none" strike="noStrike" kern="1200" baseline="0" dirty="0" err="1" smtClean="0">
                           <a:solidFill>
                             <a:schemeClr val="dk1"/>
                           </a:solidFill>
@@ -11981,7 +11981,7 @@
                         </a:rPr>
                         <a:t>JavaScriptResult</a:t>
                       </a:r>
-                      <a:endParaRPr lang="en-US" sz="1800" b="0" i="0" u="none" strike="noStrike" kern="1200" baseline="0" dirty="0" smtClean="0">
+                      <a:endParaRPr lang="en-US" sz="1800" b="1" i="0" u="none" strike="noStrike" kern="1200" baseline="0" dirty="0" smtClean="0">
                         <a:solidFill>
                           <a:schemeClr val="dk1"/>
                         </a:solidFill>
@@ -12076,7 +12076,7 @@
                         <a:defRPr/>
                       </a:pPr>
                       <a:r>
-                        <a:rPr lang="en-US" sz="1800" b="0" i="0" u="none" strike="noStrike" kern="1200" baseline="0" dirty="0" err="1" smtClean="0">
+                        <a:rPr lang="en-US" sz="1800" b="1" i="0" u="none" strike="noStrike" kern="1200" baseline="0" dirty="0" err="1" smtClean="0">
                           <a:solidFill>
                             <a:schemeClr val="dk1"/>
                           </a:solidFill>
@@ -12086,7 +12086,7 @@
                         </a:rPr>
                         <a:t>JsonResult</a:t>
                       </a:r>
-                      <a:endParaRPr lang="en-US" sz="1800" b="0" i="0" u="none" strike="noStrike" kern="1200" baseline="0" dirty="0" smtClean="0">
+                      <a:endParaRPr lang="en-US" sz="1800" b="1" i="0" u="none" strike="noStrike" kern="1200" baseline="0" dirty="0" smtClean="0">
                         <a:solidFill>
                           <a:schemeClr val="dk1"/>
                         </a:solidFill>
@@ -12205,7 +12205,7 @@
                         <a:defRPr/>
                       </a:pPr>
                       <a:r>
-                        <a:rPr lang="en-US" sz="1800" b="0" i="0" u="none" strike="noStrike" kern="1200" baseline="0" dirty="0" err="1" smtClean="0">
+                        <a:rPr lang="en-US" sz="1800" b="1" i="0" u="none" strike="noStrike" kern="1200" baseline="0" dirty="0" err="1" smtClean="0">
                           <a:solidFill>
                             <a:schemeClr val="dk1"/>
                           </a:solidFill>
@@ -12215,7 +12215,7 @@
                         </a:rPr>
                         <a:t>RedirectResult</a:t>
                       </a:r>
-                      <a:endParaRPr lang="en-US" sz="1800" b="0" i="0" u="none" strike="noStrike" kern="1200" baseline="0" dirty="0" smtClean="0">
+                      <a:endParaRPr lang="en-US" sz="1800" b="1" i="0" u="none" strike="noStrike" kern="1200" baseline="0" dirty="0" smtClean="0">
                         <a:solidFill>
                           <a:schemeClr val="dk1"/>
                         </a:solidFill>
@@ -12345,7 +12345,7 @@
                         <a:defRPr/>
                       </a:pPr>
                       <a:r>
-                        <a:rPr lang="en-US" sz="1800" b="0" i="0" u="none" strike="noStrike" kern="1200" baseline="0" dirty="0" err="1" smtClean="0">
+                        <a:rPr lang="en-US" sz="1800" b="1" i="0" u="none" strike="noStrike" kern="1200" baseline="0" dirty="0" err="1" smtClean="0">
                           <a:solidFill>
                             <a:schemeClr val="dk1"/>
                           </a:solidFill>
@@ -12355,7 +12355,7 @@
                         </a:rPr>
                         <a:t>RedirectToRouteResult</a:t>
                       </a:r>
-                      <a:endParaRPr lang="en-US" sz="1800" b="0" i="0" u="none" strike="noStrike" kern="1200" baseline="0" dirty="0" smtClean="0">
+                      <a:endParaRPr lang="en-US" sz="1800" b="1" i="0" u="none" strike="noStrike" kern="1200" baseline="0" dirty="0" smtClean="0">
                         <a:solidFill>
                           <a:schemeClr val="dk1"/>
                         </a:solidFill>
@@ -12496,7 +12496,7 @@
                         <a:defRPr/>
                       </a:pPr>
                       <a:r>
-                        <a:rPr lang="en-US" sz="1800" b="0" i="0" u="none" strike="noStrike" kern="1200" baseline="0" dirty="0" err="1" smtClean="0">
+                        <a:rPr lang="en-US" sz="1800" b="1" i="0" u="none" strike="noStrike" kern="1200" baseline="0" dirty="0" err="1" smtClean="0">
                           <a:solidFill>
                             <a:schemeClr val="dk1"/>
                           </a:solidFill>
@@ -12506,17 +12506,14 @@
                         </a:rPr>
                         <a:t>ViewResult</a:t>
                       </a:r>
-                      <a:r>
-                        <a:rPr lang="en-US" sz="1800" b="0" i="0" u="none" strike="noStrike" kern="1200" baseline="0" dirty="0" smtClean="0">
-                          <a:solidFill>
-                            <a:schemeClr val="dk1"/>
-                          </a:solidFill>
-                          <a:latin typeface="+mn-lt"/>
-                          <a:ea typeface="+mn-ea"/>
-                          <a:cs typeface="+mn-cs"/>
-                        </a:rPr>
-                        <a:t> 	</a:t>
-                      </a:r>
+                      <a:endParaRPr lang="en-US" sz="1800" b="1" i="0" u="none" strike="noStrike" kern="1200" baseline="0" dirty="0" smtClean="0">
+                        <a:solidFill>
+                          <a:schemeClr val="dk1"/>
+                        </a:solidFill>
+                        <a:latin typeface="+mn-lt"/>
+                        <a:ea typeface="+mn-ea"/>
+                        <a:cs typeface="+mn-cs"/>
+                      </a:endParaRPr>
                     </a:p>
                     <a:p>
                       <a:pPr marL="0" marR="0" indent="0" algn="l" defTabSz="914400" rtl="0" eaLnBrk="1" fontAlgn="auto" latinLnBrk="0" hangingPunct="1">
@@ -12537,7 +12534,7 @@
                         <a:defRPr/>
                       </a:pPr>
                       <a:r>
-                        <a:rPr lang="en-US" sz="1800" b="0" i="0" u="none" strike="noStrike" kern="1200" baseline="0" dirty="0" err="1" smtClean="0">
+                        <a:rPr lang="en-US" sz="1800" b="1" i="0" u="none" strike="noStrike" kern="1200" baseline="0" dirty="0" err="1" smtClean="0">
                           <a:solidFill>
                             <a:schemeClr val="dk1"/>
                           </a:solidFill>
@@ -12547,17 +12544,14 @@
                         </a:rPr>
                         <a:t>PartialViewResult</a:t>
                       </a:r>
-                      <a:r>
-                        <a:rPr lang="en-US" sz="1800" b="0" i="0" u="none" strike="noStrike" kern="1200" baseline="0" dirty="0" smtClean="0">
-                          <a:solidFill>
-                            <a:schemeClr val="dk1"/>
-                          </a:solidFill>
-                          <a:latin typeface="+mn-lt"/>
-                          <a:ea typeface="+mn-ea"/>
-                          <a:cs typeface="+mn-cs"/>
-                        </a:rPr>
-                        <a:t> 	</a:t>
-                      </a:r>
+                      <a:endParaRPr lang="en-US" sz="1800" b="1" i="0" u="none" strike="noStrike" kern="1200" baseline="0" dirty="0" smtClean="0">
+                        <a:solidFill>
+                          <a:schemeClr val="dk1"/>
+                        </a:solidFill>
+                        <a:latin typeface="+mn-lt"/>
+                        <a:ea typeface="+mn-ea"/>
+                        <a:cs typeface="+mn-cs"/>
+                      </a:endParaRPr>
                     </a:p>
                   </a:txBody>
                   <a:tcPr/>
@@ -15456,8 +15450,8 @@
         </p:blipFill>
         <p:spPr bwMode="auto">
           <a:xfrm>
-            <a:off x="5745736" y="864078"/>
-            <a:ext cx="2180204" cy="1295400"/>
+            <a:off x="5638800" y="800540"/>
+            <a:ext cx="2287140" cy="1358938"/>
           </a:xfrm>
           <a:prstGeom prst="rect">
             <a:avLst/>
@@ -16060,36 +16054,11 @@
           <a:p>
             <a:pPr lvl="1"/>
             <a:r>
-              <a:rPr lang="en-US" dirty="0"/>
+              <a:rPr lang="en-US" sz="2800" dirty="0"/>
               <a:t>Action: </a:t>
             </a:r>
             <a:r>
-              <a:rPr lang="en-US" dirty="0" err="1"/>
-              <a:t>ViewBag.Message</a:t>
-            </a:r>
-            <a:r>
-              <a:rPr lang="en-US" dirty="0"/>
-              <a:t> = "Hello World!";</a:t>
-            </a:r>
-          </a:p>
-          <a:p>
-            <a:pPr lvl="1"/>
-            <a:r>
-              <a:rPr lang="en-US" dirty="0"/>
-              <a:t>View: @</a:t>
-            </a:r>
-            <a:r>
-              <a:rPr lang="en-US" dirty="0" err="1"/>
-              <a:t>ViewBag.Message</a:t>
-            </a:r>
-            <a:r>
-              <a:rPr lang="en-US" dirty="0"/>
-              <a:t> </a:t>
-            </a:r>
-          </a:p>
-          <a:p>
-            <a:r>
-              <a:rPr lang="en-US" dirty="0" smtClean="0">
+              <a:rPr lang="en-US" sz="2800" dirty="0" err="1">
                 <a:solidFill>
                   <a:schemeClr val="accent6">
                     <a:lumMod val="20000"/>
@@ -16097,42 +16066,10 @@
                   </a:schemeClr>
                 </a:solidFill>
               </a:rPr>
-              <a:t>Strongly-typed </a:t>
-            </a:r>
-            <a:r>
-              <a:rPr lang="en-US" dirty="0" smtClean="0"/>
-              <a:t>views:</a:t>
-            </a:r>
-          </a:p>
-          <a:p>
-            <a:pPr lvl="1"/>
-            <a:r>
-              <a:rPr lang="en-US" dirty="0"/>
-              <a:t>Action: return View(model);</a:t>
-            </a:r>
-          </a:p>
-          <a:p>
-            <a:pPr lvl="1"/>
-            <a:r>
-              <a:rPr lang="en-US" dirty="0"/>
-              <a:t>View: @model </a:t>
-            </a:r>
-            <a:r>
-              <a:rPr lang="en-US" dirty="0" err="1"/>
-              <a:t>ModelDataType</a:t>
-            </a:r>
-            <a:r>
-              <a:rPr lang="en-US" dirty="0"/>
-              <a:t>;</a:t>
-            </a:r>
-          </a:p>
-          <a:p>
-            <a:r>
-              <a:rPr lang="en-US" dirty="0"/>
-              <a:t>With </a:t>
-            </a:r>
-            <a:r>
-              <a:rPr lang="en-US" dirty="0" err="1" smtClean="0">
+              <a:t>ViewBag.Message</a:t>
+            </a:r>
+            <a:r>
+              <a:rPr lang="en-US" sz="2800" dirty="0">
                 <a:solidFill>
                   <a:schemeClr val="accent6">
                     <a:lumMod val="20000"/>
@@ -16140,10 +16077,17 @@
                   </a:schemeClr>
                 </a:solidFill>
               </a:rPr>
-              <a:t>ViewData</a:t>
-            </a:r>
-            <a:r>
-              <a:rPr lang="en-US" dirty="0" smtClean="0">
+              <a:t> = "Hello World!";</a:t>
+            </a:r>
+          </a:p>
+          <a:p>
+            <a:pPr lvl="1"/>
+            <a:r>
+              <a:rPr lang="en-US" sz="2800" dirty="0"/>
+              <a:t>View: </a:t>
+            </a:r>
+            <a:r>
+              <a:rPr lang="en-US" sz="2800" dirty="0">
                 <a:solidFill>
                   <a:schemeClr val="accent6">
                     <a:lumMod val="20000"/>
@@ -16151,6 +16095,131 @@
                   </a:schemeClr>
                 </a:solidFill>
               </a:rPr>
+              <a:t>@</a:t>
+            </a:r>
+            <a:r>
+              <a:rPr lang="en-US" sz="2800" dirty="0" err="1">
+                <a:solidFill>
+                  <a:schemeClr val="accent6">
+                    <a:lumMod val="20000"/>
+                    <a:lumOff val="80000"/>
+                  </a:schemeClr>
+                </a:solidFill>
+              </a:rPr>
+              <a:t>ViewBag.Message</a:t>
+            </a:r>
+            <a:r>
+              <a:rPr lang="en-US" sz="2800" dirty="0">
+                <a:solidFill>
+                  <a:schemeClr val="accent6">
+                    <a:lumMod val="20000"/>
+                    <a:lumOff val="80000"/>
+                  </a:schemeClr>
+                </a:solidFill>
+              </a:rPr>
+              <a:t> </a:t>
+            </a:r>
+          </a:p>
+          <a:p>
+            <a:r>
+              <a:rPr lang="en-US" dirty="0" smtClean="0">
+                <a:solidFill>
+                  <a:schemeClr val="accent6">
+                    <a:lumMod val="20000"/>
+                    <a:lumOff val="80000"/>
+                  </a:schemeClr>
+                </a:solidFill>
+              </a:rPr>
+              <a:t>Strongly-typed </a:t>
+            </a:r>
+            <a:r>
+              <a:rPr lang="en-US" dirty="0" smtClean="0"/>
+              <a:t>views:</a:t>
+            </a:r>
+          </a:p>
+          <a:p>
+            <a:pPr lvl="1"/>
+            <a:r>
+              <a:rPr lang="en-US" sz="2800" dirty="0"/>
+              <a:t>Action: </a:t>
+            </a:r>
+            <a:r>
+              <a:rPr lang="en-US" sz="2800" dirty="0">
+                <a:solidFill>
+                  <a:schemeClr val="accent6">
+                    <a:lumMod val="20000"/>
+                    <a:lumOff val="80000"/>
+                  </a:schemeClr>
+                </a:solidFill>
+              </a:rPr>
+              <a:t>return View(model);</a:t>
+            </a:r>
+          </a:p>
+          <a:p>
+            <a:pPr lvl="1"/>
+            <a:r>
+              <a:rPr lang="en-US" sz="2800" dirty="0"/>
+              <a:t>View: </a:t>
+            </a:r>
+            <a:r>
+              <a:rPr lang="en-US" sz="2800" dirty="0">
+                <a:solidFill>
+                  <a:schemeClr val="accent6">
+                    <a:lumMod val="20000"/>
+                    <a:lumOff val="80000"/>
+                  </a:schemeClr>
+                </a:solidFill>
+              </a:rPr>
+              <a:t>@model </a:t>
+            </a:r>
+            <a:r>
+              <a:rPr lang="en-US" sz="2800" dirty="0" err="1">
+                <a:solidFill>
+                  <a:schemeClr val="accent6">
+                    <a:lumMod val="20000"/>
+                    <a:lumOff val="80000"/>
+                  </a:schemeClr>
+                </a:solidFill>
+              </a:rPr>
+              <a:t>ModelDataType</a:t>
+            </a:r>
+            <a:r>
+              <a:rPr lang="en-US" sz="2800" dirty="0">
+                <a:solidFill>
+                  <a:schemeClr val="accent6">
+                    <a:lumMod val="20000"/>
+                    <a:lumOff val="80000"/>
+                  </a:schemeClr>
+                </a:solidFill>
+              </a:rPr>
+              <a:t>;</a:t>
+            </a:r>
+          </a:p>
+          <a:p>
+            <a:r>
+              <a:rPr lang="en-US" dirty="0"/>
+              <a:t>With </a:t>
+            </a:r>
+            <a:r>
+              <a:rPr lang="en-US" dirty="0" err="1" smtClean="0">
+                <a:solidFill>
+                  <a:schemeClr val="accent6">
+                    <a:lumMod val="20000"/>
+                    <a:lumOff val="80000"/>
+                  </a:schemeClr>
+                </a:solidFill>
+              </a:rPr>
+              <a:t>ViewData</a:t>
+            </a:r>
+            <a:r>
+              <a:rPr lang="en-US" dirty="0" smtClean="0">
+                <a:solidFill>
+                  <a:schemeClr val="accent6">
+                    <a:lumMod val="20000"/>
+                    <a:lumOff val="80000"/>
+                  </a:schemeClr>
+                </a:solidFill>
+              </a:rPr>
               <a:t> </a:t>
             </a:r>
             <a:r>
@@ -16161,33 +16230,112 @@
           <a:p>
             <a:pPr lvl="1"/>
             <a:r>
-              <a:rPr lang="en-US" dirty="0" err="1"/>
+              <a:rPr lang="en-US" sz="2800" dirty="0" smtClean="0"/>
+              <a:t>Action: </a:t>
+            </a:r>
+            <a:r>
+              <a:rPr lang="en-US" sz="2800" dirty="0" err="1" smtClean="0">
+                <a:solidFill>
+                  <a:schemeClr val="accent6">
+                    <a:lumMod val="20000"/>
+                    <a:lumOff val="80000"/>
+                  </a:schemeClr>
+                </a:solidFill>
+              </a:rPr>
               <a:t>ViewData</a:t>
             </a:r>
             <a:r>
-              <a:rPr lang="en-US" dirty="0"/>
-              <a:t>["message"] = "Hello World</a:t>
-            </a:r>
-            <a:r>
-              <a:rPr lang="en-US" dirty="0" smtClean="0"/>
+              <a:rPr lang="en-US" sz="2800" dirty="0" smtClean="0">
+                <a:solidFill>
+                  <a:schemeClr val="accent6">
+                    <a:lumMod val="20000"/>
+                    <a:lumOff val="80000"/>
+                  </a:schemeClr>
+                </a:solidFill>
+              </a:rPr>
+              <a:t>["Message</a:t>
+            </a:r>
+            <a:r>
+              <a:rPr lang="en-US" sz="2800" dirty="0">
+                <a:solidFill>
+                  <a:schemeClr val="accent6">
+                    <a:lumMod val="20000"/>
+                    <a:lumOff val="80000"/>
+                  </a:schemeClr>
+                </a:solidFill>
+              </a:rPr>
+              <a:t>"] = "Hello World</a:t>
+            </a:r>
+            <a:r>
+              <a:rPr lang="en-US" sz="2800" dirty="0">
+                <a:solidFill>
+                  <a:schemeClr val="accent6">
+                    <a:lumMod val="20000"/>
+                    <a:lumOff val="80000"/>
+                  </a:schemeClr>
+                </a:solidFill>
+              </a:rPr>
               <a:t>!";</a:t>
             </a:r>
           </a:p>
           <a:p>
             <a:pPr lvl="1"/>
             <a:r>
-              <a:rPr lang="en-US" dirty="0" smtClean="0"/>
-              <a:t>View: @</a:t>
-            </a:r>
-            <a:r>
-              <a:rPr lang="en-US" dirty="0" err="1" smtClean="0"/>
+              <a:rPr lang="en-US" sz="2800" dirty="0" smtClean="0"/>
+              <a:t>View: </a:t>
+            </a:r>
+            <a:r>
+              <a:rPr lang="en-US" sz="2800" dirty="0">
+                <a:solidFill>
+                  <a:schemeClr val="accent6">
+                    <a:lumMod val="20000"/>
+                    <a:lumOff val="80000"/>
+                  </a:schemeClr>
+                </a:solidFill>
+              </a:rPr>
+              <a:t>@</a:t>
+            </a:r>
+            <a:r>
+              <a:rPr lang="en-US" sz="2800" dirty="0" err="1">
+                <a:solidFill>
+                  <a:schemeClr val="accent6">
+                    <a:lumMod val="20000"/>
+                    <a:lumOff val="80000"/>
+                  </a:schemeClr>
+                </a:solidFill>
+              </a:rPr>
               <a:t>ViewData</a:t>
             </a:r>
             <a:r>
-              <a:rPr lang="en-US" dirty="0" smtClean="0"/>
-              <a:t>["message"]</a:t>
-            </a:r>
-            <a:endParaRPr lang="en-US" dirty="0"/>
+              <a:rPr lang="en-US" sz="2800" dirty="0" smtClean="0">
+                <a:solidFill>
+                  <a:schemeClr val="accent6">
+                    <a:lumMod val="20000"/>
+                    <a:lumOff val="80000"/>
+                  </a:schemeClr>
+                </a:solidFill>
+              </a:rPr>
+              <a:t>["Message</a:t>
+            </a:r>
+            <a:r>
+              <a:rPr lang="en-US" sz="2800" dirty="0">
+                <a:solidFill>
+                  <a:schemeClr val="accent6">
+                    <a:lumMod val="20000"/>
+                    <a:lumOff val="80000"/>
+                  </a:schemeClr>
+                </a:solidFill>
+              </a:rPr>
+              <a:t>"]</a:t>
+            </a:r>
+            <a:endParaRPr lang="en-US" sz="2800" dirty="0">
+              <a:solidFill>
+                <a:schemeClr val="accent6">
+                  <a:lumMod val="20000"/>
+                  <a:lumOff val="80000"/>
+                </a:schemeClr>
+              </a:solidFill>
+            </a:endParaRPr>
           </a:p>
           <a:p>
             <a:pPr lvl="1"/>
@@ -22599,10 +22747,24 @@
           <a:p>
             <a:pPr lvl="1"/>
             <a:r>
-              <a:rPr lang="en-US" dirty="0" err="1"/>
+              <a:rPr lang="en-US" sz="2800" dirty="0" err="1">
+                <a:solidFill>
+                  <a:schemeClr val="accent6">
+                    <a:lumMod val="20000"/>
+                    <a:lumOff val="80000"/>
+                  </a:schemeClr>
+                </a:solidFill>
+              </a:rPr>
               <a:t>System.Web.Routing.RouteTable.Routes</a:t>
             </a:r>
-            <a:endParaRPr lang="en-US" dirty="0"/>
+            <a:endParaRPr lang="en-US" sz="2800" dirty="0">
+              <a:solidFill>
+                <a:schemeClr val="accent6">
+                  <a:lumMod val="20000"/>
+                  <a:lumOff val="80000"/>
+                </a:schemeClr>
+              </a:solidFill>
+            </a:endParaRPr>
           </a:p>
           <a:p>
             <a:r>
@@ -22650,7 +22812,7 @@
         <p:spPr>
           <a:xfrm>
             <a:off x="4648200" y="4191000"/>
-            <a:ext cx="3609975" cy="1639158"/>
+            <a:ext cx="3859812" cy="1752600"/>
           </a:xfrm>
           <a:prstGeom prst="roundRect">
             <a:avLst>
@@ -23288,7 +23450,7 @@
             <p:ph idx="1"/>
             <p:extLst>
               <p:ext uri="{D42A27DB-BD31-4B8C-83A1-F6EECF244321}">
-                <p14:modId xmlns:p14="http://schemas.microsoft.com/office/powerpoint/2010/main" val="4269250295"/>
+                <p14:modId xmlns:p14="http://schemas.microsoft.com/office/powerpoint/2010/main" val="1951783544"/>
               </p:ext>
             </p:extLst>
           </p:nvPr>
@@ -23390,7 +23552,7 @@
                     <a:lstStyle/>
                     <a:p>
                       <a:r>
-                        <a:rPr lang="en-US" sz="1800" b="0" i="1" u="none" strike="noStrike" kern="1200" baseline="0" dirty="0" err="1" smtClean="0">
+                        <a:rPr lang="en-US" sz="1800" b="1" i="1" u="none" strike="noStrike" kern="1200" baseline="0" dirty="0" err="1" smtClean="0">
                           <a:solidFill>
                             <a:schemeClr val="dk1"/>
                           </a:solidFill>
@@ -23401,7 +23563,7 @@
                         <a:t>BeginForm</a:t>
                       </a:r>
                       <a:r>
-                        <a:rPr lang="en-US" sz="1800" b="0" i="1" u="none" strike="noStrike" kern="1200" baseline="0" dirty="0" smtClean="0">
+                        <a:rPr lang="en-US" sz="1800" b="1" i="1" u="none" strike="noStrike" kern="1200" baseline="0" dirty="0" smtClean="0">
                           <a:solidFill>
                             <a:schemeClr val="dk1"/>
                           </a:solidFill>
@@ -23414,7 +23576,7 @@
                     </a:p>
                     <a:p>
                       <a:r>
-                        <a:rPr lang="en-US" sz="1800" b="0" i="1" u="none" strike="noStrike" kern="1200" baseline="0" dirty="0" err="1" smtClean="0">
+                        <a:rPr lang="en-US" sz="1800" b="1" i="1" u="none" strike="noStrike" kern="1200" baseline="0" dirty="0" err="1" smtClean="0">
                           <a:solidFill>
                             <a:schemeClr val="dk1"/>
                           </a:solidFill>
@@ -23424,7 +23586,7 @@
                         </a:rPr>
                         <a:t>BeginRouteForm</a:t>
                       </a:r>
-                      <a:endParaRPr lang="en-US" dirty="0"/>
+                      <a:endParaRPr lang="en-US" b="1" dirty="0"/>
                     </a:p>
                   </a:txBody>
                   <a:tcPr/>
@@ -23501,7 +23663,7 @@
                     <a:lstStyle/>
                     <a:p>
                       <a:r>
-                        <a:rPr lang="en-US" sz="1800" b="0" i="1" u="none" strike="noStrike" kern="1200" baseline="0" dirty="0" err="1" smtClean="0">
+                        <a:rPr lang="en-US" sz="1800" b="1" i="1" u="none" strike="noStrike" kern="1200" baseline="0" dirty="0" err="1" smtClean="0">
                           <a:solidFill>
                             <a:schemeClr val="dk1"/>
                           </a:solidFill>
@@ -23511,7 +23673,7 @@
                         </a:rPr>
                         <a:t>EndForm</a:t>
                       </a:r>
-                      <a:endParaRPr lang="en-US" dirty="0"/>
+                      <a:endParaRPr lang="en-US" b="1" dirty="0"/>
                     </a:p>
                   </a:txBody>
                   <a:tcPr/>
@@ -23581,7 +23743,7 @@
                     <a:lstStyle/>
                     <a:p>
                       <a:r>
-                        <a:rPr lang="en-US" sz="1800" b="0" i="1" u="none" strike="noStrike" kern="1200" baseline="0" dirty="0" err="1" smtClean="0">
+                        <a:rPr lang="en-US" sz="1800" b="1" i="1" u="none" strike="noStrike" kern="1200" baseline="0" dirty="0" err="1" smtClean="0">
                           <a:solidFill>
                             <a:schemeClr val="dk1"/>
                           </a:solidFill>
@@ -23592,7 +23754,7 @@
                         <a:t>CheckBox</a:t>
                       </a:r>
                       <a:r>
-                        <a:rPr lang="en-US" sz="1800" b="0" i="1" u="none" strike="noStrike" kern="1200" baseline="0" dirty="0" smtClean="0">
+                        <a:rPr lang="en-US" sz="1800" b="1" i="1" u="none" strike="noStrike" kern="1200" baseline="0" dirty="0" smtClean="0">
                           <a:solidFill>
                             <a:schemeClr val="dk1"/>
                           </a:solidFill>
@@ -23603,7 +23765,7 @@
                         <a:t>, </a:t>
                       </a:r>
                       <a:r>
-                        <a:rPr lang="en-US" sz="1800" b="0" i="1" u="none" strike="noStrike" kern="1200" baseline="0" dirty="0" err="1" smtClean="0">
+                        <a:rPr lang="en-US" sz="1800" b="1" i="1" u="none" strike="noStrike" kern="1200" baseline="0" dirty="0" err="1" smtClean="0">
                           <a:solidFill>
                             <a:schemeClr val="dk1"/>
                           </a:solidFill>
@@ -23613,7 +23775,7 @@
                         </a:rPr>
                         <a:t>CheckBoxFor</a:t>
                       </a:r>
-                      <a:endParaRPr lang="en-US" dirty="0"/>
+                      <a:endParaRPr lang="en-US" b="1" dirty="0"/>
                     </a:p>
                   </a:txBody>
                   <a:tcPr/>
@@ -23661,7 +23823,7 @@
                     <a:lstStyle/>
                     <a:p>
                       <a:r>
-                        <a:rPr lang="en-US" sz="1800" b="0" i="1" u="none" strike="noStrike" kern="1200" baseline="0" dirty="0" smtClean="0">
+                        <a:rPr lang="en-US" sz="1800" b="1" i="1" u="none" strike="noStrike" kern="1200" baseline="0" dirty="0" smtClean="0">
                           <a:solidFill>
                             <a:schemeClr val="dk1"/>
                           </a:solidFill>
@@ -23672,7 +23834,7 @@
                         <a:t>Hidden, </a:t>
                       </a:r>
                       <a:r>
-                        <a:rPr lang="en-US" sz="1800" b="0" i="1" u="none" strike="noStrike" kern="1200" baseline="0" dirty="0" err="1" smtClean="0">
+                        <a:rPr lang="en-US" sz="1800" b="1" i="1" u="none" strike="noStrike" kern="1200" baseline="0" dirty="0" err="1" smtClean="0">
                           <a:solidFill>
                             <a:schemeClr val="dk1"/>
                           </a:solidFill>
@@ -23682,7 +23844,7 @@
                         </a:rPr>
                         <a:t>HiddenFor</a:t>
                       </a:r>
-                      <a:endParaRPr lang="en-US" dirty="0"/>
+                      <a:endParaRPr lang="en-US" b="1" dirty="0"/>
                     </a:p>
                   </a:txBody>
                   <a:tcPr/>
@@ -23737,7 +23899,7 @@
                     <a:lstStyle/>
                     <a:p>
                       <a:r>
-                        <a:rPr lang="en-US" sz="1800" b="0" i="1" u="none" strike="noStrike" kern="1200" baseline="0" dirty="0" smtClean="0">
+                        <a:rPr lang="en-US" sz="1800" b="1" i="1" u="none" strike="noStrike" kern="1200" baseline="0" dirty="0" smtClean="0">
                           <a:solidFill>
                             <a:schemeClr val="dk1"/>
                           </a:solidFill>
@@ -23748,7 +23910,7 @@
                         <a:t>Password, </a:t>
                       </a:r>
                       <a:r>
-                        <a:rPr lang="en-US" sz="1800" b="0" i="1" u="none" strike="noStrike" kern="1200" baseline="0" dirty="0" err="1" smtClean="0">
+                        <a:rPr lang="en-US" sz="1800" b="1" i="1" u="none" strike="noStrike" kern="1200" baseline="0" dirty="0" err="1" smtClean="0">
                           <a:solidFill>
                             <a:schemeClr val="dk1"/>
                           </a:solidFill>
@@ -23758,7 +23920,7 @@
                         </a:rPr>
                         <a:t>PasswordFor</a:t>
                       </a:r>
-                      <a:endParaRPr lang="en-US" dirty="0"/>
+                      <a:endParaRPr lang="en-US" b="1" dirty="0"/>
                     </a:p>
                   </a:txBody>
                   <a:tcPr/>
@@ -23813,7 +23975,7 @@
                     <a:lstStyle/>
                     <a:p>
                       <a:r>
-                        <a:rPr lang="en-US" sz="1800" b="0" i="1" u="none" strike="noStrike" kern="1200" baseline="0" dirty="0" err="1" smtClean="0">
+                        <a:rPr lang="en-US" sz="1800" b="1" i="1" u="none" strike="noStrike" kern="1200" baseline="0" dirty="0" err="1" smtClean="0">
                           <a:solidFill>
                             <a:schemeClr val="dk1"/>
                           </a:solidFill>
@@ -23824,7 +23986,7 @@
                         <a:t>RadioButton</a:t>
                       </a:r>
                       <a:r>
-                        <a:rPr lang="en-US" sz="1800" b="0" i="1" u="none" strike="noStrike" kern="1200" baseline="0" dirty="0" smtClean="0">
+                        <a:rPr lang="en-US" sz="1800" b="1" i="1" u="none" strike="noStrike" kern="1200" baseline="0" dirty="0" smtClean="0">
                           <a:solidFill>
                             <a:schemeClr val="dk1"/>
                           </a:solidFill>
@@ -23837,7 +23999,7 @@
                     </a:p>
                     <a:p>
                       <a:r>
-                        <a:rPr lang="en-US" sz="1800" b="0" i="1" u="none" strike="noStrike" kern="1200" baseline="0" dirty="0" err="1" smtClean="0">
+                        <a:rPr lang="en-US" sz="1800" b="1" i="1" u="none" strike="noStrike" kern="1200" baseline="0" dirty="0" err="1" smtClean="0">
                           <a:solidFill>
                             <a:schemeClr val="dk1"/>
                           </a:solidFill>
@@ -23847,7 +24009,7 @@
                         </a:rPr>
                         <a:t>RadioButtonFor</a:t>
                       </a:r>
-                      <a:endParaRPr lang="en-US" dirty="0"/>
+                      <a:endParaRPr lang="en-US" b="1" dirty="0"/>
                     </a:p>
                   </a:txBody>
                   <a:tcPr/>
@@ -23902,7 +24064,7 @@
                     <a:lstStyle/>
                     <a:p>
                       <a:r>
-                        <a:rPr lang="en-US" sz="1800" b="0" i="1" u="none" strike="noStrike" kern="1200" baseline="0" dirty="0" err="1" smtClean="0">
+                        <a:rPr lang="en-US" sz="1800" b="1" i="1" u="none" strike="noStrike" kern="1200" baseline="0" dirty="0" err="1" smtClean="0">
                           <a:solidFill>
                             <a:schemeClr val="dk1"/>
                           </a:solidFill>
@@ -23913,7 +24075,7 @@
                         <a:t>TextBox</a:t>
                       </a:r>
                       <a:r>
-                        <a:rPr lang="en-US" sz="1800" b="0" i="1" u="none" strike="noStrike" kern="1200" baseline="0" dirty="0" smtClean="0">
+                        <a:rPr lang="en-US" sz="1800" b="1" i="1" u="none" strike="noStrike" kern="1200" baseline="0" dirty="0" smtClean="0">
                           <a:solidFill>
                             <a:schemeClr val="dk1"/>
                           </a:solidFill>
@@ -23924,7 +24086,7 @@
                         <a:t>, </a:t>
                       </a:r>
                       <a:r>
-                        <a:rPr lang="en-US" sz="1800" b="0" i="1" u="none" strike="noStrike" kern="1200" baseline="0" dirty="0" err="1" smtClean="0">
+                        <a:rPr lang="en-US" sz="1800" b="1" i="1" u="none" strike="noStrike" kern="1200" baseline="0" dirty="0" err="1" smtClean="0">
                           <a:solidFill>
                             <a:schemeClr val="dk1"/>
                           </a:solidFill>
@@ -23934,7 +24096,7 @@
                         </a:rPr>
                         <a:t>TextBoxFor</a:t>
                       </a:r>
-                      <a:endParaRPr lang="en-US" dirty="0"/>
+                      <a:endParaRPr lang="en-US" b="1" dirty="0"/>
                     </a:p>
                   </a:txBody>
                   <a:tcPr/>
@@ -23989,7 +24151,7 @@
                     <a:lstStyle/>
                     <a:p>
                       <a:r>
-                        <a:rPr lang="en-US" sz="1800" b="0" i="1" u="none" strike="noStrike" kern="1200" baseline="0" dirty="0" smtClean="0">
+                        <a:rPr lang="en-US" sz="1800" b="1" i="1" u="none" strike="noStrike" kern="1200" baseline="0" dirty="0" smtClean="0">
                           <a:solidFill>
                             <a:schemeClr val="dk1"/>
                           </a:solidFill>
@@ -24000,7 +24162,7 @@
                         <a:t>Label, </a:t>
                       </a:r>
                       <a:r>
-                        <a:rPr lang="en-US" sz="1800" b="0" i="1" u="none" strike="noStrike" kern="1200" baseline="0" dirty="0" err="1" smtClean="0">
+                        <a:rPr lang="en-US" sz="1800" b="1" i="1" u="none" strike="noStrike" kern="1200" baseline="0" dirty="0" err="1" smtClean="0">
                           <a:solidFill>
                             <a:schemeClr val="dk1"/>
                           </a:solidFill>
@@ -24010,7 +24172,7 @@
                         </a:rPr>
                         <a:t>LabelFor</a:t>
                       </a:r>
-                      <a:endParaRPr lang="en-US" dirty="0"/>
+                      <a:endParaRPr lang="en-US" b="1" dirty="0"/>
                     </a:p>
                   </a:txBody>
                   <a:tcPr/>
@@ -24161,14 +24323,14 @@
             <p:ph idx="1"/>
             <p:extLst>
               <p:ext uri="{D42A27DB-BD31-4B8C-83A1-F6EECF244321}">
-                <p14:modId xmlns:p14="http://schemas.microsoft.com/office/powerpoint/2010/main" val="2652821565"/>
+                <p14:modId xmlns:p14="http://schemas.microsoft.com/office/powerpoint/2010/main" val="2737501521"/>
               </p:ext>
             </p:extLst>
           </p:nvPr>
         </p:nvGraphicFramePr>
         <p:xfrm>
-          <a:off x="800101" y="1021080"/>
-          <a:ext cx="7543799" cy="5227320"/>
+          <a:off x="457201" y="1021080"/>
+          <a:ext cx="7886700" cy="4958080"/>
         </p:xfrm>
         <a:graphic>
           <a:graphicData uri="http://schemas.openxmlformats.org/drawingml/2006/table">
@@ -24177,9 +24339,9 @@
                 <a:tableStyleId>{073A0DAA-6AF3-43AB-8588-CEC1D06C72B9}</a:tableStyleId>
               </a:tblPr>
               <a:tblGrid>
-                <a:gridCol w="2240731"/>
-                <a:gridCol w="1344440"/>
-                <a:gridCol w="3958628"/>
+                <a:gridCol w="2438399"/>
+                <a:gridCol w="1309735"/>
+                <a:gridCol w="4138566"/>
               </a:tblGrid>
               <a:tr h="370840">
                 <a:tc>
@@ -24263,7 +24425,7 @@
                     <a:lstStyle/>
                     <a:p>
                       <a:r>
-                        <a:rPr lang="en-US" sz="1800" b="0" i="1" u="none" strike="noStrike" kern="1200" baseline="0" dirty="0" err="1" smtClean="0">
+                        <a:rPr lang="en-US" sz="1800" b="1" i="1" u="none" strike="noStrike" kern="1200" baseline="0" dirty="0" err="1" smtClean="0">
                           <a:solidFill>
                             <a:schemeClr val="dk1"/>
                           </a:solidFill>
@@ -24274,7 +24436,7 @@
                         <a:t>ActionLink</a:t>
                       </a:r>
                       <a:r>
-                        <a:rPr lang="en-US" sz="1800" b="0" i="1" u="none" strike="noStrike" kern="1200" baseline="0" dirty="0" smtClean="0">
+                        <a:rPr lang="en-US" sz="1800" b="1" i="1" u="none" strike="noStrike" kern="1200" baseline="0" dirty="0" smtClean="0">
                           <a:solidFill>
                             <a:schemeClr val="dk1"/>
                           </a:solidFill>
@@ -24285,7 +24447,7 @@
                         <a:t>, </a:t>
                       </a:r>
                       <a:r>
-                        <a:rPr lang="en-US" sz="1800" b="0" i="1" u="none" strike="noStrike" kern="1200" baseline="0" dirty="0" err="1" smtClean="0">
+                        <a:rPr lang="en-US" sz="1800" b="1" i="1" u="none" strike="noStrike" kern="1200" baseline="0" dirty="0" err="1" smtClean="0">
                           <a:solidFill>
                             <a:schemeClr val="dk1"/>
                           </a:solidFill>
@@ -24295,7 +24457,7 @@
                         </a:rPr>
                         <a:t>RouteLink</a:t>
                       </a:r>
-                      <a:endParaRPr lang="en-US" dirty="0"/>
+                      <a:endParaRPr lang="en-US" b="1" dirty="0"/>
                     </a:p>
                   </a:txBody>
                   <a:tcPr/>
@@ -24350,7 +24512,7 @@
                     <a:lstStyle/>
                     <a:p>
                       <a:r>
-                        <a:rPr lang="en-US" sz="1800" b="0" i="1" u="none" strike="noStrike" kern="1200" baseline="0" dirty="0" err="1" smtClean="0">
+                        <a:rPr lang="en-US" sz="1800" b="1" i="1" u="none" strike="noStrike" kern="1200" baseline="0" dirty="0" err="1" smtClean="0">
                           <a:solidFill>
                             <a:schemeClr val="dk1"/>
                           </a:solidFill>
@@ -24361,7 +24523,7 @@
                         <a:t>DropDownList</a:t>
                       </a:r>
                       <a:r>
-                        <a:rPr lang="en-US" sz="1800" b="0" i="1" u="none" strike="noStrike" kern="1200" baseline="0" dirty="0" smtClean="0">
+                        <a:rPr lang="en-US" sz="1800" b="1" i="1" u="none" strike="noStrike" kern="1200" baseline="0" dirty="0" smtClean="0">
                           <a:solidFill>
                             <a:schemeClr val="dk1"/>
                           </a:solidFill>
@@ -24374,7 +24536,7 @@
                     </a:p>
                     <a:p>
                       <a:r>
-                        <a:rPr lang="en-US" sz="1800" b="0" i="1" u="none" strike="noStrike" kern="1200" baseline="0" dirty="0" err="1" smtClean="0">
+                        <a:rPr lang="en-US" sz="1800" b="1" i="1" u="none" strike="noStrike" kern="1200" baseline="0" dirty="0" err="1" smtClean="0">
                           <a:solidFill>
                             <a:schemeClr val="dk1"/>
                           </a:solidFill>
@@ -24384,7 +24546,7 @@
                         </a:rPr>
                         <a:t>DropDownListFor</a:t>
                       </a:r>
-                      <a:endParaRPr lang="en-US" dirty="0"/>
+                      <a:endParaRPr lang="en-US" b="1" dirty="0"/>
                     </a:p>
                   </a:txBody>
                   <a:tcPr/>
@@ -24439,7 +24601,7 @@
                     <a:lstStyle/>
                     <a:p>
                       <a:r>
-                        <a:rPr lang="en-US" sz="1800" b="0" i="1" u="none" strike="noStrike" kern="1200" baseline="0" dirty="0" err="1" smtClean="0">
+                        <a:rPr lang="en-US" sz="1800" b="1" i="1" u="none" strike="noStrike" kern="1200" baseline="0" dirty="0" err="1" smtClean="0">
                           <a:solidFill>
                             <a:schemeClr val="dk1"/>
                           </a:solidFill>
@@ -24450,7 +24612,7 @@
                         <a:t>ListBox</a:t>
                       </a:r>
                       <a:r>
-                        <a:rPr lang="en-US" sz="1800" b="0" i="1" u="none" strike="noStrike" kern="1200" baseline="0" dirty="0" smtClean="0">
+                        <a:rPr lang="en-US" sz="1800" b="1" i="1" u="none" strike="noStrike" kern="1200" baseline="0" dirty="0" smtClean="0">
                           <a:solidFill>
                             <a:schemeClr val="dk1"/>
                           </a:solidFill>
@@ -24461,7 +24623,7 @@
                         <a:t>, </a:t>
                       </a:r>
                       <a:r>
-                        <a:rPr lang="en-US" sz="1800" b="0" i="1" u="none" strike="noStrike" kern="1200" baseline="0" dirty="0" err="1" smtClean="0">
+                        <a:rPr lang="en-US" sz="1800" b="1" i="1" u="none" strike="noStrike" kern="1200" baseline="0" dirty="0" err="1" smtClean="0">
                           <a:solidFill>
                             <a:schemeClr val="dk1"/>
                           </a:solidFill>
@@ -24471,7 +24633,7 @@
                         </a:rPr>
                         <a:t>ListBoxFor</a:t>
                       </a:r>
-                      <a:endParaRPr lang="en-US" dirty="0"/>
+                      <a:endParaRPr lang="en-US" b="1" dirty="0"/>
                     </a:p>
                   </a:txBody>
                   <a:tcPr/>
@@ -24526,7 +24688,7 @@
                     <a:lstStyle/>
                     <a:p>
                       <a:r>
-                        <a:rPr lang="en-US" sz="1800" b="0" i="1" u="none" strike="noStrike" kern="1200" baseline="0" dirty="0" err="1" smtClean="0">
+                        <a:rPr lang="en-US" sz="1800" b="1" i="1" u="none" strike="noStrike" kern="1200" baseline="0" dirty="0" err="1" smtClean="0">
                           <a:solidFill>
                             <a:schemeClr val="dk1"/>
                           </a:solidFill>
@@ -24537,7 +24699,7 @@
                         <a:t>TextArea</a:t>
                       </a:r>
                       <a:r>
-                        <a:rPr lang="en-US" sz="1800" b="0" i="1" u="none" strike="noStrike" kern="1200" baseline="0" dirty="0" smtClean="0">
+                        <a:rPr lang="en-US" sz="1800" b="1" i="1" u="none" strike="noStrike" kern="1200" baseline="0" dirty="0" smtClean="0">
                           <a:solidFill>
                             <a:schemeClr val="dk1"/>
                           </a:solidFill>
@@ -24548,7 +24710,7 @@
                         <a:t>, </a:t>
                       </a:r>
                       <a:r>
-                        <a:rPr lang="en-US" sz="1800" b="0" i="1" u="none" strike="noStrike" kern="1200" baseline="0" dirty="0" err="1" smtClean="0">
+                        <a:rPr lang="en-US" sz="1800" b="1" i="1" u="none" strike="noStrike" kern="1200" baseline="0" dirty="0" err="1" smtClean="0">
                           <a:solidFill>
                             <a:schemeClr val="dk1"/>
                           </a:solidFill>
@@ -24558,7 +24720,7 @@
                         </a:rPr>
                         <a:t>TextAreaFor</a:t>
                       </a:r>
-                      <a:endParaRPr lang="en-US" dirty="0"/>
+                      <a:endParaRPr lang="en-US" b="1" dirty="0"/>
                     </a:p>
                   </a:txBody>
                   <a:tcPr/>
@@ -24613,7 +24775,7 @@
                     <a:lstStyle/>
                     <a:p>
                       <a:r>
-                        <a:rPr lang="en-US" sz="1800" b="0" i="1" u="none" strike="noStrike" kern="1200" baseline="0" dirty="0" smtClean="0">
+                        <a:rPr lang="en-US" sz="1800" b="1" i="1" u="none" strike="noStrike" kern="1200" baseline="0" dirty="0" smtClean="0">
                           <a:solidFill>
                             <a:schemeClr val="dk1"/>
                           </a:solidFill>
@@ -24623,7 +24785,7 @@
                         </a:rPr>
                         <a:t>Partial</a:t>
                       </a:r>
-                      <a:endParaRPr lang="en-US" dirty="0"/>
+                      <a:endParaRPr lang="en-US" b="1" dirty="0"/>
                     </a:p>
                   </a:txBody>
                   <a:tcPr/>
@@ -24678,7 +24840,7 @@
                     <a:lstStyle/>
                     <a:p>
                       <a:r>
-                        <a:rPr lang="en-US" sz="1800" b="0" i="1" u="none" strike="noStrike" kern="1200" baseline="0" dirty="0" err="1" smtClean="0">
+                        <a:rPr lang="en-US" sz="1800" b="1" i="1" u="none" strike="noStrike" kern="1200" baseline="0" dirty="0" err="1" smtClean="0">
                           <a:solidFill>
                             <a:schemeClr val="dk1"/>
                           </a:solidFill>
@@ -24688,7 +24850,7 @@
                         </a:rPr>
                         <a:t>RenderPartial</a:t>
                       </a:r>
-                      <a:endParaRPr lang="en-US" dirty="0"/>
+                      <a:endParaRPr lang="en-US" b="1" dirty="0"/>
                     </a:p>
                   </a:txBody>
                   <a:tcPr/>
@@ -24756,7 +24918,7 @@
                     <a:lstStyle/>
                     <a:p>
                       <a:r>
-                        <a:rPr lang="en-US" sz="1800" b="0" i="1" u="none" strike="noStrike" kern="1200" baseline="0" dirty="0" err="1" smtClean="0">
+                        <a:rPr lang="en-US" sz="1800" b="1" i="1" u="none" strike="noStrike" kern="1200" baseline="0" dirty="0" err="1" smtClean="0">
                           <a:solidFill>
                             <a:schemeClr val="dk1"/>
                           </a:solidFill>
@@ -24767,7 +24929,7 @@
                         <a:t>ValidationMessage</a:t>
                       </a:r>
                       <a:r>
-                        <a:rPr lang="en-US" sz="1800" b="0" i="1" u="none" strike="noStrike" kern="1200" baseline="0" dirty="0" smtClean="0">
+                        <a:rPr lang="en-US" sz="1800" b="1" i="1" u="none" strike="noStrike" kern="1200" baseline="0" dirty="0" smtClean="0">
                           <a:solidFill>
                             <a:schemeClr val="dk1"/>
                           </a:solidFill>
@@ -24780,7 +24942,7 @@
                     </a:p>
                     <a:p>
                       <a:r>
-                        <a:rPr lang="en-US" sz="1800" b="0" i="1" u="none" strike="noStrike" kern="1200" baseline="0" dirty="0" err="1" smtClean="0">
+                        <a:rPr lang="en-US" sz="1800" b="1" i="1" u="none" strike="noStrike" kern="1200" baseline="0" dirty="0" err="1" smtClean="0">
                           <a:solidFill>
                             <a:schemeClr val="dk1"/>
                           </a:solidFill>
@@ -24790,7 +24952,7 @@
                         </a:rPr>
                         <a:t>ValidationMessageFor</a:t>
                       </a:r>
-                      <a:endParaRPr lang="en-US" dirty="0"/>
+                      <a:endParaRPr lang="en-US" b="1" dirty="0"/>
                     </a:p>
                   </a:txBody>
                   <a:tcPr/>
@@ -24845,7 +25007,7 @@
                     <a:lstStyle/>
                     <a:p>
                       <a:r>
-                        <a:rPr lang="en-US" sz="1800" b="0" i="1" u="none" strike="noStrike" kern="1200" baseline="0" dirty="0" err="1" smtClean="0">
+                        <a:rPr lang="en-US" sz="1800" b="1" i="1" u="none" strike="noStrike" kern="1200" baseline="0" dirty="0" err="1" smtClean="0">
                           <a:solidFill>
                             <a:schemeClr val="dk1"/>
                           </a:solidFill>
@@ -24855,7 +25017,7 @@
                         </a:rPr>
                         <a:t>ValidationSummary</a:t>
                       </a:r>
-                      <a:endParaRPr lang="en-US" dirty="0"/>
+                      <a:endParaRPr lang="en-US" b="1" dirty="0"/>
                     </a:p>
                   </a:txBody>
                   <a:tcPr/>

</xml_diff>

<commit_message>
Demo for 02. ASP.NET-MVC-Essentials removed (nothing interesting, just new project with Glimpse)
</commit_message>
<xml_diff>
--- a/02. ASP.NET-MVC-Essentials/ASP.NET MVC Essentials.pptx
+++ b/02. ASP.NET-MVC-Essentials/ASP.NET MVC Essentials.pptx
@@ -9783,66 +9783,6 @@
           <a:chExt cx="0" cy="0"/>
         </a:xfrm>
       </p:grpSpPr>
-      <p:sp>
-        <p:nvSpPr>
-          <p:cNvPr id="5" name="Title 4"/>
-          <p:cNvSpPr>
-            <a:spLocks noGrp="1"/>
-          </p:cNvSpPr>
-          <p:nvPr>
-            <p:ph type="ctrTitle"/>
-          </p:nvPr>
-        </p:nvSpPr>
-        <p:spPr>
-          <a:xfrm>
-            <a:off x="609600" y="4953001"/>
-            <a:ext cx="7924800" cy="685800"/>
-          </a:xfrm>
-        </p:spPr>
-        <p:txBody>
-          <a:bodyPr/>
-          <a:lstStyle/>
-          <a:p>
-            <a:r>
-              <a:rPr lang="en-US" dirty="0"/>
-              <a:t>Demo</a:t>
-            </a:r>
-            <a:r>
-              <a:rPr lang="en-US" dirty="0" smtClean="0"/>
-              <a:t>: Routes</a:t>
-            </a:r>
-            <a:endParaRPr lang="en-US" dirty="0"/>
-          </a:p>
-        </p:txBody>
-      </p:sp>
-      <p:sp>
-        <p:nvSpPr>
-          <p:cNvPr id="6" name="Subtitle 5"/>
-          <p:cNvSpPr>
-            <a:spLocks noGrp="1"/>
-          </p:cNvSpPr>
-          <p:nvPr>
-            <p:ph type="subTitle" idx="1"/>
-          </p:nvPr>
-        </p:nvSpPr>
-        <p:spPr>
-          <a:xfrm>
-            <a:off x="1790700" y="5715000"/>
-            <a:ext cx="5562600" cy="457200"/>
-          </a:xfrm>
-        </p:spPr>
-        <p:txBody>
-          <a:bodyPr/>
-          <a:lstStyle/>
-          <a:p>
-            <a:r>
-              <a:rPr lang="en-US" dirty="0" smtClean="0"/>
-              <a:t>ASP.NET MVC Routing</a:t>
-            </a:r>
-            <a:endParaRPr lang="en-US" dirty="0"/>
-          </a:p>
-        </p:txBody>
-      </p:sp>
       <p:pic>
         <p:nvPicPr>
           <p:cNvPr id="3" name="Picture 2"/>
@@ -9880,6 +9820,66 @@
           </a:effectLst>
         </p:spPr>
       </p:pic>
+      <p:sp>
+        <p:nvSpPr>
+          <p:cNvPr id="5" name="Title 4"/>
+          <p:cNvSpPr>
+            <a:spLocks noGrp="1"/>
+          </p:cNvSpPr>
+          <p:nvPr>
+            <p:ph type="ctrTitle"/>
+          </p:nvPr>
+        </p:nvSpPr>
+        <p:spPr>
+          <a:xfrm>
+            <a:off x="609600" y="4953001"/>
+            <a:ext cx="7924800" cy="685800"/>
+          </a:xfrm>
+        </p:spPr>
+        <p:txBody>
+          <a:bodyPr/>
+          <a:lstStyle/>
+          <a:p>
+            <a:r>
+              <a:rPr lang="en-US" dirty="0" smtClean="0"/>
+              <a:t>Live Demo</a:t>
+            </a:r>
+            <a:r>
+              <a:rPr lang="en-US" dirty="0" smtClean="0"/>
+              <a:t>: Routes</a:t>
+            </a:r>
+            <a:endParaRPr lang="en-US" dirty="0"/>
+          </a:p>
+        </p:txBody>
+      </p:sp>
+      <p:sp>
+        <p:nvSpPr>
+          <p:cNvPr id="6" name="Subtitle 5"/>
+          <p:cNvSpPr>
+            <a:spLocks noGrp="1"/>
+          </p:cNvSpPr>
+          <p:nvPr>
+            <p:ph type="subTitle" idx="1"/>
+          </p:nvPr>
+        </p:nvSpPr>
+        <p:spPr>
+          <a:xfrm>
+            <a:off x="1790700" y="5715000"/>
+            <a:ext cx="5562600" cy="457200"/>
+          </a:xfrm>
+        </p:spPr>
+        <p:txBody>
+          <a:bodyPr/>
+          <a:lstStyle/>
+          <a:p>
+            <a:r>
+              <a:rPr lang="en-US" dirty="0" smtClean="0"/>
+              <a:t>ASP.NET MVC Routing</a:t>
+            </a:r>
+            <a:endParaRPr lang="en-US" dirty="0"/>
+          </a:p>
+        </p:txBody>
+      </p:sp>
     </p:spTree>
     <p:extLst>
       <p:ext uri="{BB962C8B-B14F-4D97-AF65-F5344CB8AC3E}">
@@ -16264,7 +16264,14 @@
                   </a:schemeClr>
                 </a:solidFill>
               </a:rPr>
-              <a:t>"] = "Hello World</a:t>
+              <a:t>"] = "Hello World!";</a:t>
+            </a:r>
+          </a:p>
+          <a:p>
+            <a:pPr lvl="1"/>
+            <a:r>
+              <a:rPr lang="en-US" sz="2800" dirty="0" smtClean="0"/>
+              <a:t>View: </a:t>
             </a:r>
             <a:r>
               <a:rPr lang="en-US" sz="2800" dirty="0">
@@ -16275,17 +16282,10 @@
                   </a:schemeClr>
                 </a:solidFill>
               </a:rPr>
-              <a:t>!";</a:t>
-            </a:r>
-          </a:p>
-          <a:p>
-            <a:pPr lvl="1"/>
-            <a:r>
-              <a:rPr lang="en-US" sz="2800" dirty="0" smtClean="0"/>
-              <a:t>View: </a:t>
-            </a:r>
-            <a:r>
-              <a:rPr lang="en-US" sz="2800" dirty="0">
+              <a:t>@</a:t>
+            </a:r>
+            <a:r>
+              <a:rPr lang="en-US" sz="2800" dirty="0" err="1">
                 <a:solidFill>
                   <a:schemeClr val="accent6">
                     <a:lumMod val="20000"/>
@@ -16293,10 +16293,10 @@
                   </a:schemeClr>
                 </a:solidFill>
               </a:rPr>
-              <a:t>@</a:t>
-            </a:r>
-            <a:r>
-              <a:rPr lang="en-US" sz="2800" dirty="0" err="1">
+              <a:t>ViewData</a:t>
+            </a:r>
+            <a:r>
+              <a:rPr lang="en-US" sz="2800" dirty="0" smtClean="0">
                 <a:solidFill>
                   <a:schemeClr val="accent6">
                     <a:lumMod val="20000"/>
@@ -16304,10 +16304,10 @@
                   </a:schemeClr>
                 </a:solidFill>
               </a:rPr>
-              <a:t>ViewData</a:t>
-            </a:r>
-            <a:r>
-              <a:rPr lang="en-US" sz="2800" dirty="0" smtClean="0">
+              <a:t>["Message</a:t>
+            </a:r>
+            <a:r>
+              <a:rPr lang="en-US" sz="2800" dirty="0">
                 <a:solidFill>
                   <a:schemeClr val="accent6">
                     <a:lumMod val="20000"/>
@@ -16315,27 +16315,8 @@
                   </a:schemeClr>
                 </a:solidFill>
               </a:rPr>
-              <a:t>["Message</a:t>
-            </a:r>
-            <a:r>
-              <a:rPr lang="en-US" sz="2800" dirty="0">
-                <a:solidFill>
-                  <a:schemeClr val="accent6">
-                    <a:lumMod val="20000"/>
-                    <a:lumOff val="80000"/>
-                  </a:schemeClr>
-                </a:solidFill>
-              </a:rPr>
               <a:t>"]</a:t>
             </a:r>
-            <a:endParaRPr lang="en-US" sz="2800" dirty="0">
-              <a:solidFill>
-                <a:schemeClr val="accent6">
-                  <a:lumMod val="20000"/>
-                  <a:lumOff val="80000"/>
-                </a:schemeClr>
-              </a:solidFill>
-            </a:endParaRPr>
           </a:p>
           <a:p>
             <a:pPr lvl="1"/>
@@ -27356,8 +27337,8 @@
           <a:lstStyle/>
           <a:p>
             <a:r>
-              <a:rPr lang="en-US" dirty="0"/>
-              <a:t>Demo</a:t>
+              <a:rPr lang="en-US" dirty="0" smtClean="0"/>
+              <a:t>Live Demo</a:t>
             </a:r>
             <a:r>
               <a:rPr lang="en-US" dirty="0" smtClean="0"/>

</xml_diff>

<commit_message>
Added slides for bundling and minification in ASP.NET MVC Essentials.pptx
</commit_message>
<xml_diff>
--- a/02. ASP.NET-MVC-Essentials/ASP.NET MVC Essentials.pptx
+++ b/02. ASP.NET-MVC-Essentials/ASP.NET MVC Essentials.pptx
@@ -5,10 +5,10 @@
     <p:sldMasterId id="2147483672" r:id="rId1"/>
   </p:sldMasterIdLst>
   <p:notesMasterIdLst>
-    <p:notesMasterId r:id="rId54"/>
+    <p:notesMasterId r:id="rId58"/>
   </p:notesMasterIdLst>
   <p:handoutMasterIdLst>
-    <p:handoutMasterId r:id="rId55"/>
+    <p:handoutMasterId r:id="rId59"/>
   </p:handoutMasterIdLst>
   <p:sldIdLst>
     <p:sldId id="338" r:id="rId2"/>
@@ -57,17 +57,21 @@
     <p:sldId id="428" r:id="rId45"/>
     <p:sldId id="429" r:id="rId46"/>
     <p:sldId id="424" r:id="rId47"/>
-    <p:sldId id="419" r:id="rId48"/>
-    <p:sldId id="420" r:id="rId49"/>
-    <p:sldId id="436" r:id="rId50"/>
-    <p:sldId id="370" r:id="rId51"/>
-    <p:sldId id="334" r:id="rId52"/>
-    <p:sldId id="403" r:id="rId53"/>
+    <p:sldId id="451" r:id="rId48"/>
+    <p:sldId id="452" r:id="rId49"/>
+    <p:sldId id="453" r:id="rId50"/>
+    <p:sldId id="454" r:id="rId51"/>
+    <p:sldId id="419" r:id="rId52"/>
+    <p:sldId id="420" r:id="rId53"/>
+    <p:sldId id="436" r:id="rId54"/>
+    <p:sldId id="370" r:id="rId55"/>
+    <p:sldId id="334" r:id="rId56"/>
+    <p:sldId id="403" r:id="rId57"/>
   </p:sldIdLst>
   <p:sldSz cx="9144000" cy="6858000" type="screen4x3"/>
   <p:notesSz cx="6881813" cy="9296400"/>
   <p:custDataLst>
-    <p:tags r:id="rId56"/>
+    <p:tags r:id="rId60"/>
   </p:custDataLst>
   <p:defaultTextStyle>
     <a:defPPr>
@@ -259,6 +263,14 @@
             <p14:sldId id="424"/>
           </p14:sldIdLst>
         </p14:section>
+        <p14:section name="Bundling and Minification" id="{472FF956-E54F-4655-8368-4434FBB90AD1}">
+          <p14:sldIdLst>
+            <p14:sldId id="451"/>
+            <p14:sldId id="452"/>
+            <p14:sldId id="453"/>
+            <p14:sldId id="454"/>
+          </p14:sldIdLst>
+        </p14:section>
         <p14:section name="Areas" id="{4B8612F7-1EBE-4AB5-AE2C-84495B302C6F}">
           <p14:sldIdLst>
             <p14:sldId id="419"/>
@@ -422,7 +434,7 @@
             <a:fld id="{3BF7C7B5-275F-4D1F-9AB4-9255447DBC73}" type="datetimeFigureOut">
               <a:rPr lang="en-US"/>
               <a:pPr/>
-              <a:t>2/1/2016</a:t>
+              <a:t>2/2/2016</a:t>
             </a:fld>
             <a:endParaRPr lang="en-US" dirty="0"/>
           </a:p>
@@ -653,7 +665,7 @@
             <a:fld id="{9B46F231-FB2B-4655-A644-E2477325E686}" type="datetimeFigureOut">
               <a:rPr lang="en-US"/>
               <a:pPr/>
-              <a:t>2/1/2016</a:t>
+              <a:t>2/2/2016</a:t>
             </a:fld>
             <a:endParaRPr lang="en-US" dirty="0"/>
           </a:p>
@@ -1147,7 +1159,92 @@
             <a:fld id="{6FB4F6EA-423E-42DF-9292-215E7D886C4E}" type="slidenum">
               <a:rPr lang="en-US" smtClean="0"/>
               <a:pPr/>
-              <a:t>51</a:t>
+              <a:t>48</a:t>
+            </a:fld>
+            <a:endParaRPr lang="en-US" dirty="0"/>
+          </a:p>
+        </p:txBody>
+      </p:sp>
+    </p:spTree>
+    <p:extLst>
+      <p:ext uri="{BB962C8B-B14F-4D97-AF65-F5344CB8AC3E}">
+        <p14:creationId xmlns:p14="http://schemas.microsoft.com/office/powerpoint/2010/main" val="3971522356"/>
+      </p:ext>
+    </p:extLst>
+  </p:cSld>
+  <p:clrMapOvr>
+    <a:masterClrMapping/>
+  </p:clrMapOvr>
+</p:notes>
+</file>
+
+<file path=ppt/notesSlides/notesSlide3.xml><?xml version="1.0" encoding="utf-8"?>
+<p:notes xmlns:a="http://schemas.openxmlformats.org/drawingml/2006/main" xmlns:r="http://schemas.openxmlformats.org/officeDocument/2006/relationships" xmlns:p="http://schemas.openxmlformats.org/presentationml/2006/main">
+  <p:cSld>
+    <p:spTree>
+      <p:nvGrpSpPr>
+        <p:cNvPr id="1" name=""/>
+        <p:cNvGrpSpPr/>
+        <p:nvPr/>
+      </p:nvGrpSpPr>
+      <p:grpSpPr>
+        <a:xfrm>
+          <a:off x="0" y="0"/>
+          <a:ext cx="0" cy="0"/>
+          <a:chOff x="0" y="0"/>
+          <a:chExt cx="0" cy="0"/>
+        </a:xfrm>
+      </p:grpSpPr>
+      <p:sp>
+        <p:nvSpPr>
+          <p:cNvPr id="2" name="Slide Image Placeholder 1"/>
+          <p:cNvSpPr>
+            <a:spLocks noGrp="1" noRot="1" noChangeAspect="1"/>
+          </p:cNvSpPr>
+          <p:nvPr>
+            <p:ph type="sldImg"/>
+          </p:nvPr>
+        </p:nvSpPr>
+        <p:spPr/>
+      </p:sp>
+      <p:sp>
+        <p:nvSpPr>
+          <p:cNvPr id="3" name="Notes Placeholder 2"/>
+          <p:cNvSpPr>
+            <a:spLocks noGrp="1"/>
+          </p:cNvSpPr>
+          <p:nvPr>
+            <p:ph type="body" idx="1"/>
+          </p:nvPr>
+        </p:nvSpPr>
+        <p:spPr/>
+        <p:txBody>
+          <a:bodyPr/>
+          <a:lstStyle/>
+          <a:p>
+            <a:endParaRPr lang="en-US"/>
+          </a:p>
+        </p:txBody>
+      </p:sp>
+      <p:sp>
+        <p:nvSpPr>
+          <p:cNvPr id="4" name="Slide Number Placeholder 3"/>
+          <p:cNvSpPr>
+            <a:spLocks noGrp="1"/>
+          </p:cNvSpPr>
+          <p:nvPr>
+            <p:ph type="sldNum" sz="quarter" idx="10"/>
+          </p:nvPr>
+        </p:nvSpPr>
+        <p:spPr/>
+        <p:txBody>
+          <a:bodyPr/>
+          <a:lstStyle/>
+          <a:p>
+            <a:fld id="{6FB4F6EA-423E-42DF-9292-215E7D886C4E}" type="slidenum">
+              <a:rPr lang="en-US" smtClean="0"/>
+              <a:pPr/>
+              <a:t>55</a:t>
             </a:fld>
             <a:endParaRPr lang="en-US" dirty="0"/>
           </a:p>
@@ -9842,11 +9939,7 @@
           <a:p>
             <a:r>
               <a:rPr lang="en-US" dirty="0" smtClean="0"/>
-              <a:t>Live Demo</a:t>
-            </a:r>
-            <a:r>
-              <a:rPr lang="en-US" dirty="0" smtClean="0"/>
-              <a:t>: Routes</a:t>
+              <a:t>Live Demo: Routes</a:t>
             </a:r>
             <a:endParaRPr lang="en-US" dirty="0"/>
           </a:p>
@@ -10543,7 +10636,7 @@
         </p:nvSpPr>
         <p:spPr>
           <a:xfrm>
-            <a:off x="228600" y="838200"/>
+            <a:off x="228600" y="762000"/>
             <a:ext cx="8686800" cy="5791200"/>
           </a:xfrm>
         </p:spPr>
@@ -10551,6 +10644,14 @@
           <a:bodyPr/>
           <a:lstStyle/>
           <a:p>
+            <a:pPr>
+              <a:spcBef>
+                <a:spcPts val="300"/>
+              </a:spcBef>
+              <a:spcAft>
+                <a:spcPts val="300"/>
+              </a:spcAft>
+            </a:pPr>
             <a:r>
               <a:rPr lang="en-US" dirty="0" smtClean="0"/>
               <a:t>ASP.NET MVC Routing</a:t>
@@ -10558,13 +10659,28 @@
             <a:endParaRPr lang="bg-BG" dirty="0" smtClean="0"/>
           </a:p>
           <a:p>
-            <a:pPr lvl="1"/>
+            <a:pPr lvl="1">
+              <a:spcBef>
+                <a:spcPts val="300"/>
+              </a:spcBef>
+              <a:spcAft>
+                <a:spcPts val="300"/>
+              </a:spcAft>
+            </a:pPr>
             <a:r>
               <a:rPr lang="en-US" dirty="0" smtClean="0"/>
               <a:t>Route constraints</a:t>
             </a:r>
           </a:p>
           <a:p>
+            <a:pPr>
+              <a:spcBef>
+                <a:spcPts val="300"/>
+              </a:spcBef>
+              <a:spcAft>
+                <a:spcPts val="300"/>
+              </a:spcAft>
+            </a:pPr>
             <a:r>
               <a:rPr lang="en-US" dirty="0"/>
               <a:t>Controllers and </a:t>
@@ -10576,40 +10692,108 @@
             <a:endParaRPr lang="bg-BG" dirty="0" smtClean="0"/>
           </a:p>
           <a:p>
-            <a:pPr lvl="1"/>
+            <a:pPr lvl="1">
+              <a:spcBef>
+                <a:spcPts val="300"/>
+              </a:spcBef>
+              <a:spcAft>
+                <a:spcPts val="300"/>
+              </a:spcAft>
+            </a:pPr>
             <a:r>
               <a:rPr lang="en-US" dirty="0" smtClean="0"/>
               <a:t>Action results and filters</a:t>
             </a:r>
           </a:p>
           <a:p>
+            <a:pPr>
+              <a:spcBef>
+                <a:spcPts val="300"/>
+              </a:spcBef>
+              <a:spcAft>
+                <a:spcPts val="300"/>
+              </a:spcAft>
+            </a:pPr>
             <a:r>
               <a:rPr lang="en-US" dirty="0" smtClean="0"/>
               <a:t>Razor Views</a:t>
             </a:r>
           </a:p>
           <a:p>
-            <a:pPr lvl="1"/>
+            <a:pPr lvl="1">
+              <a:spcBef>
+                <a:spcPts val="300"/>
+              </a:spcBef>
+              <a:spcAft>
+                <a:spcPts val="300"/>
+              </a:spcAft>
+            </a:pPr>
             <a:r>
               <a:rPr lang="en-US" dirty="0" smtClean="0"/>
               <a:t>Layout and sections</a:t>
             </a:r>
           </a:p>
           <a:p>
-            <a:pPr lvl="1"/>
+            <a:pPr lvl="1">
+              <a:spcBef>
+                <a:spcPts val="300"/>
+              </a:spcBef>
+              <a:spcAft>
+                <a:spcPts val="300"/>
+              </a:spcAft>
+            </a:pPr>
             <a:r>
               <a:rPr lang="en-US" dirty="0" smtClean="0"/>
               <a:t>Helpers</a:t>
             </a:r>
           </a:p>
           <a:p>
-            <a:pPr lvl="1"/>
+            <a:pPr lvl="1">
+              <a:spcBef>
+                <a:spcPts val="300"/>
+              </a:spcBef>
+              <a:spcAft>
+                <a:spcPts val="300"/>
+              </a:spcAft>
+            </a:pPr>
             <a:r>
               <a:rPr lang="en-US" dirty="0" smtClean="0"/>
-              <a:t>Partial views</a:t>
-            </a:r>
-          </a:p>
-          <a:p>
+              <a:t>Partial </a:t>
+            </a:r>
+            <a:r>
+              <a:rPr lang="en-US" dirty="0" smtClean="0"/>
+              <a:t>views</a:t>
+            </a:r>
+            <a:endParaRPr lang="bg-BG" dirty="0" smtClean="0"/>
+          </a:p>
+          <a:p>
+            <a:pPr>
+              <a:spcBef>
+                <a:spcPts val="300"/>
+              </a:spcBef>
+              <a:spcAft>
+                <a:spcPts val="300"/>
+              </a:spcAft>
+            </a:pPr>
+            <a:r>
+              <a:rPr lang="en-US" dirty="0"/>
+              <a:t>Bundling and </a:t>
+            </a:r>
+            <a:r>
+              <a:rPr lang="en-US" dirty="0" err="1"/>
+              <a:t>Minification</a:t>
+            </a:r>
+            <a:endParaRPr lang="en-US" dirty="0" smtClean="0"/>
+          </a:p>
+          <a:p>
+            <a:pPr>
+              <a:spcBef>
+                <a:spcPts val="300"/>
+              </a:spcBef>
+              <a:spcAft>
+                <a:spcPts val="300"/>
+              </a:spcAft>
+            </a:pPr>
             <a:r>
               <a:rPr lang="en-US" dirty="0" smtClean="0"/>
               <a:t>Areas</a:t>
@@ -10670,7 +10854,7 @@
         </p:blipFill>
         <p:spPr bwMode="auto">
           <a:xfrm rot="1502284">
-            <a:off x="4465999" y="3135181"/>
+            <a:off x="4923199" y="3017663"/>
             <a:ext cx="4482227" cy="3735189"/>
           </a:xfrm>
           <a:prstGeom prst="rect">
@@ -26949,8 +27133,12 @@
           <a:lstStyle/>
           <a:p>
             <a:r>
-              <a:rPr lang="en-US" dirty="0" smtClean="0"/>
-              <a:t>Areas</a:t>
+              <a:rPr lang="en-US" dirty="0"/>
+              <a:t>Bundling and </a:t>
+            </a:r>
+            <a:r>
+              <a:rPr lang="en-US" dirty="0" err="1"/>
+              <a:t>Minification</a:t>
             </a:r>
             <a:endParaRPr lang="en-US" dirty="0"/>
           </a:p>
@@ -26958,7 +27146,7 @@
       </p:sp>
       <p:pic>
         <p:nvPicPr>
-          <p:cNvPr id="4098" name="Picture 2" descr="http://www.kansas-aa.org/images/area25%20color%20map.JPG"/>
+          <p:cNvPr id="1026" name="Picture 2" descr="B/M"/>
           <p:cNvPicPr>
             <a:picLocks noChangeAspect="1" noChangeArrowheads="1"/>
           </p:cNvPicPr>
@@ -26979,22 +27167,54 @@
         </p:blipFill>
         <p:spPr bwMode="auto">
           <a:xfrm>
-            <a:off x="1319212" y="2362200"/>
-            <a:ext cx="6505575" cy="3552825"/>
+            <a:off x="533400" y="2133600"/>
+            <a:ext cx="3657600" cy="4403210"/>
           </a:xfrm>
           <a:prstGeom prst="rect">
             <a:avLst/>
           </a:prstGeom>
-          <a:ln>
-            <a:noFill/>
-          </a:ln>
-          <a:effectLst>
-            <a:outerShdw blurRad="190500" algn="tl" rotWithShape="0">
-              <a:srgbClr val="000000">
-                <a:alpha val="70000"/>
-              </a:srgbClr>
-            </a:outerShdw>
-          </a:effectLst>
+          <a:noFill/>
+          <a:extLst>
+            <a:ext uri="{909E8E84-426E-40DD-AFC4-6F175D3DCCD1}">
+              <a14:hiddenFill xmlns:a14="http://schemas.microsoft.com/office/drawing/2010/main">
+                <a:solidFill>
+                  <a:srgbClr val="FFFFFF"/>
+                </a:solidFill>
+              </a14:hiddenFill>
+            </a:ext>
+          </a:extLst>
+        </p:spPr>
+      </p:pic>
+      <p:pic>
+        <p:nvPicPr>
+          <p:cNvPr id="1028" name="Picture 4" descr="http://media-www-asp.azureedge.net/media/39122/netcapbm2.png"/>
+          <p:cNvPicPr>
+            <a:picLocks noChangeAspect="1" noChangeArrowheads="1"/>
+          </p:cNvPicPr>
+          <p:nvPr/>
+        </p:nvPicPr>
+        <p:blipFill>
+          <a:blip r:embed="rId3">
+            <a:extLst>
+              <a:ext uri="{28A0092B-C50C-407E-A947-70E740481C1C}">
+                <a14:useLocalDpi xmlns:a14="http://schemas.microsoft.com/office/drawing/2010/main" val="0"/>
+              </a:ext>
+            </a:extLst>
+          </a:blip>
+          <a:srcRect/>
+          <a:stretch>
+            <a:fillRect/>
+          </a:stretch>
+        </p:blipFill>
+        <p:spPr bwMode="auto">
+          <a:xfrm>
+            <a:off x="4572000" y="2777867"/>
+            <a:ext cx="3819525" cy="3114676"/>
+          </a:xfrm>
+          <a:prstGeom prst="rect">
+            <a:avLst/>
+          </a:prstGeom>
+          <a:noFill/>
           <a:extLst>
             <a:ext uri="{909E8E84-426E-40DD-AFC4-6F175D3DCCD1}">
               <a14:hiddenFill xmlns:a14="http://schemas.microsoft.com/office/drawing/2010/main">
@@ -27009,7 +27229,7 @@
     </p:spTree>
     <p:extLst>
       <p:ext uri="{BB962C8B-B14F-4D97-AF65-F5344CB8AC3E}">
-        <p14:creationId xmlns:p14="http://schemas.microsoft.com/office/powerpoint/2010/main" val="1737583065"/>
+        <p14:creationId xmlns:p14="http://schemas.microsoft.com/office/powerpoint/2010/main" val="2413613712"/>
       </p:ext>
     </p:extLst>
   </p:cSld>
@@ -27045,7 +27265,7 @@
       </p:grpSpPr>
       <p:sp>
         <p:nvSpPr>
-          <p:cNvPr id="2" name="Title 1"/>
+          <p:cNvPr id="4" name="Title 3"/>
           <p:cNvSpPr>
             <a:spLocks noGrp="1"/>
           </p:cNvSpPr>
@@ -27059,16 +27279,15 @@
           <a:lstStyle/>
           <a:p>
             <a:r>
-              <a:rPr lang="en-US" dirty="0" smtClean="0"/>
-              <a:t>Areas</a:t>
-            </a:r>
-            <a:endParaRPr lang="en-US" dirty="0"/>
+              <a:rPr lang="en-US" dirty="0"/>
+              <a:t>Bundling</a:t>
+            </a:r>
           </a:p>
         </p:txBody>
       </p:sp>
       <p:sp>
         <p:nvSpPr>
-          <p:cNvPr id="3" name="Content Placeholder 2"/>
+          <p:cNvPr id="5" name="Content Placeholder 4"/>
           <p:cNvSpPr>
             <a:spLocks noGrp="1"/>
           </p:cNvSpPr>
@@ -27076,143 +27295,94 @@
             <p:ph idx="1"/>
           </p:nvPr>
         </p:nvSpPr>
-        <p:spPr>
-          <a:xfrm>
-            <a:off x="228600" y="838200"/>
-            <a:ext cx="8686800" cy="5791200"/>
-          </a:xfrm>
-        </p:spPr>
+        <p:spPr/>
         <p:txBody>
           <a:bodyPr/>
           <a:lstStyle/>
           <a:p>
-            <a:pPr>
-              <a:spcBef>
-                <a:spcPts val="300"/>
-              </a:spcBef>
-              <a:spcAft>
-                <a:spcPts val="300"/>
-              </a:spcAft>
-            </a:pPr>
+            <a:r>
+              <a:rPr lang="en-US" dirty="0"/>
+              <a:t>M</a:t>
+            </a:r>
             <a:r>
               <a:rPr lang="en-US" dirty="0" smtClean="0"/>
-              <a:t>Some </a:t>
+              <a:t>akes </a:t>
             </a:r>
             <a:r>
               <a:rPr lang="en-US" dirty="0"/>
-              <a:t>applications can have a large number of </a:t>
+              <a:t>it easy to combine or bundle multiple files into a single </a:t>
             </a:r>
             <a:r>
               <a:rPr lang="en-US" dirty="0" smtClean="0"/>
-              <a:t>controllers</a:t>
-            </a:r>
-          </a:p>
-          <a:p>
-            <a:pPr>
-              <a:spcBef>
-                <a:spcPts val="300"/>
-              </a:spcBef>
-              <a:spcAft>
-                <a:spcPts val="300"/>
-              </a:spcAft>
-            </a:pPr>
+              <a:t>file</a:t>
+            </a:r>
+          </a:p>
+          <a:p>
             <a:r>
               <a:rPr lang="en-US" dirty="0"/>
-              <a:t>ASP.NET MVC lets </a:t>
+              <a:t>You can create CSS, JavaScript and other </a:t>
             </a:r>
             <a:r>
               <a:rPr lang="en-US" dirty="0" smtClean="0"/>
-              <a:t>us partition </a:t>
-            </a:r>
+              <a:t>bundles</a:t>
+            </a:r>
+          </a:p>
+          <a:p>
             <a:r>
               <a:rPr lang="en-US" dirty="0"/>
-              <a:t>Web applications into smaller units </a:t>
+              <a:t>Fewer files means </a:t>
             </a:r>
             <a:r>
               <a:rPr lang="en-US" dirty="0" smtClean="0"/>
-              <a:t>(areas)</a:t>
-            </a:r>
-          </a:p>
-          <a:p>
-            <a:pPr>
-              <a:spcBef>
-                <a:spcPts val="300"/>
-              </a:spcBef>
-              <a:spcAft>
-                <a:spcPts val="300"/>
-              </a:spcAft>
-            </a:pPr>
+              <a:t>fewer</a:t>
+            </a:r>
+            <a:br>
+              <a:rPr lang="en-US" dirty="0" smtClean="0"/>
+            </a:br>
+            <a:r>
+              <a:rPr lang="en-US" dirty="0" smtClean="0"/>
+              <a:t>HTTP </a:t>
+            </a:r>
             <a:r>
               <a:rPr lang="en-US" dirty="0"/>
-              <a:t>An area is effectively an MVC structure inside an </a:t>
+              <a:t>requests and </a:t>
             </a:r>
             <a:r>
               <a:rPr lang="en-US" dirty="0" smtClean="0"/>
-              <a:t>application</a:t>
-            </a:r>
-          </a:p>
-          <a:p>
-            <a:pPr>
-              <a:spcBef>
-                <a:spcPts val="300"/>
-              </a:spcBef>
-              <a:spcAft>
-                <a:spcPts val="300"/>
-              </a:spcAft>
-            </a:pPr>
-            <a:r>
+              <a:t>that</a:t>
+            </a:r>
+            <a:br>
               <a:rPr lang="en-US" dirty="0" smtClean="0"/>
-              <a:t>Example: large e-commerce application</a:t>
-            </a:r>
-          </a:p>
-          <a:p>
-            <a:pPr lvl="1">
-              <a:spcBef>
-                <a:spcPts val="300"/>
-              </a:spcBef>
-              <a:spcAft>
-                <a:spcPts val="300"/>
-              </a:spcAft>
-            </a:pPr>
+            </a:br>
             <a:r>
               <a:rPr lang="en-US" dirty="0" smtClean="0"/>
-              <a:t>Main store, users</a:t>
-            </a:r>
-          </a:p>
-          <a:p>
-            <a:pPr lvl="1">
-              <a:spcBef>
-                <a:spcPts val="300"/>
-              </a:spcBef>
-              <a:spcAft>
-                <a:spcPts val="300"/>
-              </a:spcAft>
-            </a:pPr>
+              <a:t>can </a:t>
+            </a:r>
+            <a:r>
+              <a:rPr lang="en-US" dirty="0"/>
+              <a:t>improve first </a:t>
+            </a:r>
             <a:r>
               <a:rPr lang="en-US" dirty="0" smtClean="0"/>
-              <a:t>Blog, forum</a:t>
-            </a:r>
-          </a:p>
-          <a:p>
-            <a:pPr lvl="1">
-              <a:spcBef>
-                <a:spcPts val="300"/>
-              </a:spcBef>
-              <a:spcAft>
-                <a:spcPts val="300"/>
-              </a:spcAft>
-            </a:pPr>
-            <a:r>
+              <a:t>page</a:t>
+            </a:r>
+            <a:br>
               <a:rPr lang="en-US" dirty="0" smtClean="0"/>
-              <a:t>Administration</a:t>
-            </a:r>
-            <a:endParaRPr lang="en-US" dirty="0"/>
+            </a:br>
+            <a:r>
+              <a:rPr lang="en-US" dirty="0" smtClean="0"/>
+              <a:t>load </a:t>
+            </a:r>
+            <a:r>
+              <a:rPr lang="en-US" dirty="0"/>
+              <a:t>performance</a:t>
+            </a:r>
           </a:p>
         </p:txBody>
       </p:sp>
       <p:sp>
         <p:nvSpPr>
-          <p:cNvPr id="4" name="Slide Number Placeholder 3"/>
+          <p:cNvPr id="6" name="Slide Number Placeholder 5"/>
           <p:cNvSpPr>
             <a:spLocks noGrp="1"/>
           </p:cNvSpPr>
@@ -27241,61 +27411,55 @@
       </p:sp>
       <p:pic>
         <p:nvPicPr>
-          <p:cNvPr id="5" name="Picture 4"/>
+          <p:cNvPr id="2050" name="Picture 2" descr="http://media-www-asp.azureedge.net/media/39122/netcapbm2.png"/>
           <p:cNvPicPr>
-            <a:picLocks noChangeAspect="1"/>
+            <a:picLocks noChangeAspect="1" noChangeArrowheads="1"/>
           </p:cNvPicPr>
           <p:nvPr/>
         </p:nvPicPr>
         <p:blipFill>
-          <a:blip r:embed="rId2"/>
+          <a:blip r:embed="rId3">
+            <a:extLst>
+              <a:ext uri="{28A0092B-C50C-407E-A947-70E740481C1C}">
+                <a14:useLocalDpi xmlns:a14="http://schemas.microsoft.com/office/drawing/2010/main" val="0"/>
+              </a:ext>
+            </a:extLst>
+          </a:blip>
+          <a:srcRect/>
           <a:stretch>
             <a:fillRect/>
           </a:stretch>
         </p:blipFill>
-        <p:spPr>
+        <p:spPr bwMode="auto">
           <a:xfrm>
-            <a:off x="5486400" y="4953000"/>
-            <a:ext cx="1905000" cy="1387748"/>
+            <a:off x="5181600" y="3200400"/>
+            <a:ext cx="3585915" cy="2924176"/>
           </a:xfrm>
-          <a:prstGeom prst="round2DiagRect">
-            <a:avLst>
-              <a:gd name="adj1" fmla="val 16667"/>
-              <a:gd name="adj2" fmla="val 0"/>
-            </a:avLst>
+          <a:prstGeom prst="rect">
+            <a:avLst/>
           </a:prstGeom>
-          <a:ln w="88900" cap="sq">
-            <a:solidFill>
-              <a:srgbClr val="FFFFFF"/>
-            </a:solidFill>
-            <a:miter lim="800000"/>
-          </a:ln>
-          <a:effectLst>
-            <a:outerShdw blurRad="254000" algn="tl" rotWithShape="0">
-              <a:srgbClr val="000000">
-                <a:alpha val="43000"/>
-              </a:srgbClr>
-            </a:outerShdw>
-          </a:effectLst>
+          <a:noFill/>
+          <a:extLst>
+            <a:ext uri="{909E8E84-426E-40DD-AFC4-6F175D3DCCD1}">
+              <a14:hiddenFill xmlns:a14="http://schemas.microsoft.com/office/drawing/2010/main">
+                <a:solidFill>
+                  <a:srgbClr val="FFFFFF"/>
+                </a:solidFill>
+              </a14:hiddenFill>
+            </a:ext>
+          </a:extLst>
         </p:spPr>
       </p:pic>
     </p:spTree>
     <p:extLst>
       <p:ext uri="{BB962C8B-B14F-4D97-AF65-F5344CB8AC3E}">
-        <p14:creationId xmlns:p14="http://schemas.microsoft.com/office/powerpoint/2010/main" val="645649328"/>
+        <p14:creationId xmlns:p14="http://schemas.microsoft.com/office/powerpoint/2010/main" val="1913346772"/>
       </p:ext>
     </p:extLst>
   </p:cSld>
   <p:clrMapOvr>
     <a:masterClrMapping/>
   </p:clrMapOvr>
-  <p:timing>
-    <p:tnLst>
-      <p:par>
-        <p:cTn id="1" dur="indefinite" restart="never" nodeType="tmRoot"/>
-      </p:par>
-    </p:tnLst>
-  </p:timing>
 </p:sld>
 </file>
 
@@ -27318,18 +27482,41 @@
       </p:grpSpPr>
       <p:sp>
         <p:nvSpPr>
-          <p:cNvPr id="5" name="Title 4"/>
+          <p:cNvPr id="2" name="Title 1"/>
           <p:cNvSpPr>
             <a:spLocks noGrp="1"/>
           </p:cNvSpPr>
           <p:nvPr>
-            <p:ph type="ctrTitle"/>
+            <p:ph type="title"/>
+          </p:nvPr>
+        </p:nvSpPr>
+        <p:spPr/>
+        <p:txBody>
+          <a:bodyPr/>
+          <a:lstStyle/>
+          <a:p>
+            <a:r>
+              <a:rPr lang="en-US" dirty="0" err="1"/>
+              <a:t>Minification</a:t>
+            </a:r>
+            <a:endParaRPr lang="en-US" dirty="0"/>
+          </a:p>
+        </p:txBody>
+      </p:sp>
+      <p:sp>
+        <p:nvSpPr>
+          <p:cNvPr id="3" name="Content Placeholder 2"/>
+          <p:cNvSpPr>
+            <a:spLocks noGrp="1"/>
+          </p:cNvSpPr>
+          <p:nvPr>
+            <p:ph idx="1"/>
           </p:nvPr>
         </p:nvSpPr>
         <p:spPr>
           <a:xfrm>
-            <a:off x="609600" y="4953001"/>
-            <a:ext cx="7924800" cy="685800"/>
+            <a:off x="228600" y="838200"/>
+            <a:ext cx="8686800" cy="5791200"/>
           </a:xfrm>
         </p:spPr>
         <p:txBody>
@@ -27338,47 +27525,77 @@
           <a:p>
             <a:r>
               <a:rPr lang="en-US" dirty="0" smtClean="0"/>
-              <a:t>Live Demo</a:t>
+              <a:t>Performs </a:t>
+            </a:r>
+            <a:r>
+              <a:rPr lang="en-US" dirty="0"/>
+              <a:t>a variety of different code optimizations to scripts or </a:t>
             </a:r>
             <a:r>
               <a:rPr lang="en-US" dirty="0" smtClean="0"/>
-              <a:t>: Areas</a:t>
-            </a:r>
-            <a:endParaRPr lang="en-US" dirty="0"/>
+              <a:t>CSS such as:</a:t>
+            </a:r>
+          </a:p>
+          <a:p>
+            <a:pPr lvl="1"/>
+            <a:r>
+              <a:rPr lang="en-US" dirty="0" smtClean="0"/>
+              <a:t>removing </a:t>
+            </a:r>
+            <a:r>
+              <a:rPr lang="en-US" dirty="0"/>
+              <a:t>unnecessary white space and </a:t>
+            </a:r>
+            <a:r>
+              <a:rPr lang="en-US" dirty="0" smtClean="0"/>
+              <a:t>comments</a:t>
+            </a:r>
+          </a:p>
+          <a:p>
+            <a:pPr lvl="1"/>
+            <a:r>
+              <a:rPr lang="en-US" dirty="0" smtClean="0"/>
+              <a:t>shortening </a:t>
+            </a:r>
+            <a:r>
+              <a:rPr lang="en-US" dirty="0"/>
+              <a:t>variable names to one character</a:t>
+            </a:r>
           </a:p>
         </p:txBody>
       </p:sp>
       <p:sp>
         <p:nvSpPr>
-          <p:cNvPr id="6" name="Subtitle 5"/>
+          <p:cNvPr id="4" name="Slide Number Placeholder 3"/>
           <p:cNvSpPr>
             <a:spLocks noGrp="1"/>
           </p:cNvSpPr>
           <p:nvPr>
-            <p:ph type="subTitle" idx="1"/>
+            <p:ph type="sldNum" sz="quarter" idx="10"/>
           </p:nvPr>
         </p:nvSpPr>
-        <p:spPr>
-          <a:xfrm>
-            <a:off x="1790700" y="5715000"/>
-            <a:ext cx="5562600" cy="457200"/>
-          </a:xfrm>
-        </p:spPr>
+        <p:spPr/>
         <p:txBody>
           <a:bodyPr/>
           <a:lstStyle/>
           <a:p>
-            <a:r>
-              <a:rPr lang="en-US" dirty="0" smtClean="0"/>
-              <a:t>ASP.NET MVC structures (areas)</a:t>
-            </a:r>
+            <a:pPr>
+              <a:defRPr/>
+            </a:pPr>
+            <a:fld id="{58452FF4-89E3-4D1B-9927-2DBDC00E58D7}" type="slidenum">
+              <a:rPr lang="en-US" smtClean="0"/>
+              <a:pPr>
+                <a:defRPr/>
+              </a:pPr>
+              <a:t>49</a:t>
+            </a:fld>
             <a:endParaRPr lang="en-US" dirty="0"/>
           </a:p>
         </p:txBody>
       </p:sp>
       <p:pic>
         <p:nvPicPr>
-          <p:cNvPr id="4" name="Picture 3"/>
+          <p:cNvPr id="6" name="Picture 5"/>
           <p:cNvPicPr>
             <a:picLocks noChangeAspect="1"/>
           </p:cNvPicPr>
@@ -27392,41 +27609,48 @@
         </p:blipFill>
         <p:spPr>
           <a:xfrm>
-            <a:off x="1395412" y="1143000"/>
-            <a:ext cx="6353175" cy="3590925"/>
+            <a:off x="1524000" y="3810000"/>
+            <a:ext cx="6101339" cy="1981200"/>
           </a:xfrm>
           <a:prstGeom prst="rect">
             <a:avLst/>
           </a:prstGeom>
-          <a:ln>
-            <a:noFill/>
-          </a:ln>
-          <a:effectLst>
-            <a:outerShdw blurRad="190500" algn="tl" rotWithShape="0">
-              <a:srgbClr val="000000">
-                <a:alpha val="70000"/>
-              </a:srgbClr>
-            </a:outerShdw>
-          </a:effectLst>
+        </p:spPr>
+      </p:pic>
+      <p:pic>
+        <p:nvPicPr>
+          <p:cNvPr id="7" name="Picture 6"/>
+          <p:cNvPicPr>
+            <a:picLocks noChangeAspect="1"/>
+          </p:cNvPicPr>
+          <p:nvPr/>
+        </p:nvPicPr>
+        <p:blipFill>
+          <a:blip r:embed="rId3"/>
+          <a:stretch>
+            <a:fillRect/>
+          </a:stretch>
+        </p:blipFill>
+        <p:spPr>
+          <a:xfrm>
+            <a:off x="442859" y="5953998"/>
+            <a:ext cx="8258282" cy="332502"/>
+          </a:xfrm>
+          <a:prstGeom prst="rect">
+            <a:avLst/>
+          </a:prstGeom>
         </p:spPr>
       </p:pic>
     </p:spTree>
     <p:extLst>
       <p:ext uri="{BB962C8B-B14F-4D97-AF65-F5344CB8AC3E}">
-        <p14:creationId xmlns:p14="http://schemas.microsoft.com/office/powerpoint/2010/main" val="2597991593"/>
+        <p14:creationId xmlns:p14="http://schemas.microsoft.com/office/powerpoint/2010/main" val="2280139074"/>
       </p:ext>
     </p:extLst>
   </p:cSld>
   <p:clrMapOvr>
     <a:masterClrMapping/>
   </p:clrMapOvr>
-  <p:timing>
-    <p:tnLst>
-      <p:par>
-        <p:cTn id="1" dur="indefinite" restart="never" nodeType="tmRoot"/>
-      </p:par>
-    </p:tnLst>
-  </p:timing>
 </p:sld>
 </file>
 
@@ -28419,6 +28643,1149 @@
             <p:ph type="title"/>
           </p:nvPr>
         </p:nvSpPr>
+        <p:spPr>
+          <a:xfrm>
+            <a:off x="1828800" y="76200"/>
+            <a:ext cx="7086600" cy="990600"/>
+          </a:xfrm>
+        </p:spPr>
+        <p:txBody>
+          <a:bodyPr/>
+          <a:lstStyle/>
+          <a:p>
+            <a:r>
+              <a:rPr lang="en-US" dirty="0"/>
+              <a:t>Controlling Bundling and </a:t>
+            </a:r>
+            <a:r>
+              <a:rPr lang="en-US" dirty="0" err="1"/>
+              <a:t>Minification</a:t>
+            </a:r>
+            <a:endParaRPr lang="en-US" dirty="0"/>
+          </a:p>
+        </p:txBody>
+      </p:sp>
+      <p:sp>
+        <p:nvSpPr>
+          <p:cNvPr id="3" name="Content Placeholder 2"/>
+          <p:cNvSpPr>
+            <a:spLocks noGrp="1"/>
+          </p:cNvSpPr>
+          <p:nvPr>
+            <p:ph idx="1"/>
+          </p:nvPr>
+        </p:nvSpPr>
+        <p:spPr>
+          <a:xfrm>
+            <a:off x="152400" y="990600"/>
+            <a:ext cx="8915400" cy="5638800"/>
+          </a:xfrm>
+        </p:spPr>
+        <p:txBody>
+          <a:bodyPr/>
+          <a:lstStyle/>
+          <a:p>
+            <a:r>
+              <a:rPr lang="en-US" sz="2800" dirty="0"/>
+              <a:t>E</a:t>
+            </a:r>
+            <a:r>
+              <a:rPr lang="en-US" sz="2800" dirty="0" smtClean="0"/>
+              <a:t>nabled </a:t>
+            </a:r>
+            <a:r>
+              <a:rPr lang="en-US" sz="2800" dirty="0"/>
+              <a:t>or disabled by setting the value of the </a:t>
+            </a:r>
+            <a:r>
+              <a:rPr lang="en-US" sz="2800" dirty="0">
+                <a:solidFill>
+                  <a:schemeClr val="accent6">
+                    <a:lumMod val="20000"/>
+                    <a:lumOff val="80000"/>
+                  </a:schemeClr>
+                </a:solidFill>
+              </a:rPr>
+              <a:t>debug</a:t>
+            </a:r>
+            <a:r>
+              <a:rPr lang="en-US" sz="2800" dirty="0"/>
+              <a:t> attribute in the </a:t>
+            </a:r>
+            <a:r>
+              <a:rPr lang="en-US" sz="2800" dirty="0">
+                <a:solidFill>
+                  <a:schemeClr val="accent6">
+                    <a:lumMod val="20000"/>
+                    <a:lumOff val="80000"/>
+                  </a:schemeClr>
+                </a:solidFill>
+              </a:rPr>
+              <a:t>compilation Element </a:t>
+            </a:r>
+            <a:r>
+              <a:rPr lang="en-US" sz="2800" dirty="0" smtClean="0"/>
+              <a:t>in </a:t>
+            </a:r>
+            <a:r>
+              <a:rPr lang="en-US" sz="2800" dirty="0"/>
+              <a:t>the </a:t>
+            </a:r>
+            <a:r>
+              <a:rPr lang="en-US" sz="2800" dirty="0" err="1" smtClean="0">
+                <a:solidFill>
+                  <a:schemeClr val="accent6">
+                    <a:lumMod val="20000"/>
+                    <a:lumOff val="80000"/>
+                  </a:schemeClr>
+                </a:solidFill>
+              </a:rPr>
+              <a:t>Web.config</a:t>
+            </a:r>
+            <a:endParaRPr lang="en-US" sz="2800" dirty="0" smtClean="0"/>
+          </a:p>
+          <a:p>
+            <a:pPr lvl="1"/>
+            <a:r>
+              <a:rPr lang="en-US" sz="2600" dirty="0" smtClean="0"/>
+              <a:t>To </a:t>
+            </a:r>
+            <a:r>
+              <a:rPr lang="en-US" sz="2600" dirty="0"/>
+              <a:t>enable bundling and </a:t>
+            </a:r>
+            <a:r>
+              <a:rPr lang="en-US" sz="2600" dirty="0" err="1"/>
+              <a:t>minification</a:t>
+            </a:r>
+            <a:r>
+              <a:rPr lang="en-US" sz="2600" dirty="0"/>
+              <a:t>, set the debug value to "</a:t>
+            </a:r>
+            <a:r>
+              <a:rPr lang="en-US" sz="2600" dirty="0">
+                <a:solidFill>
+                  <a:schemeClr val="accent6">
+                    <a:lumMod val="20000"/>
+                    <a:lumOff val="80000"/>
+                  </a:schemeClr>
+                </a:solidFill>
+              </a:rPr>
+              <a:t>false</a:t>
+            </a:r>
+            <a:r>
+              <a:rPr lang="en-US" sz="2600" dirty="0" smtClean="0"/>
+              <a:t>"</a:t>
+            </a:r>
+          </a:p>
+          <a:p>
+            <a:r>
+              <a:rPr lang="en-US" sz="2800" dirty="0" smtClean="0"/>
+              <a:t>Can be </a:t>
+            </a:r>
+            <a:r>
+              <a:rPr lang="en-US" sz="2800" dirty="0" err="1" smtClean="0"/>
+              <a:t>overrided</a:t>
+            </a:r>
+            <a:r>
+              <a:rPr lang="en-US" sz="2800" dirty="0" smtClean="0"/>
+              <a:t> the setting </a:t>
+            </a:r>
+            <a:r>
+              <a:rPr lang="en-US" sz="2800" dirty="0"/>
+              <a:t>with </a:t>
+            </a:r>
+            <a:r>
+              <a:rPr lang="en-US" sz="2800" dirty="0" err="1">
+                <a:solidFill>
+                  <a:schemeClr val="accent6">
+                    <a:lumMod val="20000"/>
+                    <a:lumOff val="80000"/>
+                  </a:schemeClr>
+                </a:solidFill>
+              </a:rPr>
+              <a:t>EnableOptimizations</a:t>
+            </a:r>
+            <a:r>
+              <a:rPr lang="en-US" sz="2800" dirty="0" smtClean="0"/>
+              <a:t> </a:t>
+            </a:r>
+            <a:r>
+              <a:rPr lang="en-US" sz="2800" dirty="0"/>
+              <a:t>property on the </a:t>
+            </a:r>
+            <a:r>
+              <a:rPr lang="en-US" sz="2800" dirty="0" err="1">
+                <a:solidFill>
+                  <a:schemeClr val="accent6">
+                    <a:lumMod val="20000"/>
+                    <a:lumOff val="80000"/>
+                  </a:schemeClr>
+                </a:solidFill>
+              </a:rPr>
+              <a:t>BundleTable</a:t>
+            </a:r>
+            <a:r>
+              <a:rPr lang="en-US" sz="2800" dirty="0"/>
+              <a:t> </a:t>
+            </a:r>
+            <a:r>
+              <a:rPr lang="en-US" sz="2800" dirty="0" smtClean="0"/>
+              <a:t>class</a:t>
+            </a:r>
+            <a:endParaRPr lang="en-US" sz="2800" dirty="0"/>
+          </a:p>
+        </p:txBody>
+      </p:sp>
+      <p:sp>
+        <p:nvSpPr>
+          <p:cNvPr id="4" name="Slide Number Placeholder 3"/>
+          <p:cNvSpPr>
+            <a:spLocks noGrp="1"/>
+          </p:cNvSpPr>
+          <p:nvPr>
+            <p:ph type="sldNum" sz="quarter" idx="10"/>
+          </p:nvPr>
+        </p:nvSpPr>
+        <p:spPr/>
+        <p:txBody>
+          <a:bodyPr/>
+          <a:lstStyle/>
+          <a:p>
+            <a:pPr>
+              <a:defRPr/>
+            </a:pPr>
+            <a:fld id="{58452FF4-89E3-4D1B-9927-2DBDC00E58D7}" type="slidenum">
+              <a:rPr lang="en-US" smtClean="0"/>
+              <a:pPr>
+                <a:defRPr/>
+              </a:pPr>
+              <a:t>50</a:t>
+            </a:fld>
+            <a:endParaRPr lang="en-US" dirty="0"/>
+          </a:p>
+        </p:txBody>
+      </p:sp>
+      <p:sp>
+        <p:nvSpPr>
+          <p:cNvPr id="9" name="Text Placeholder 6"/>
+          <p:cNvSpPr txBox="1">
+            <a:spLocks/>
+          </p:cNvSpPr>
+          <p:nvPr/>
+        </p:nvSpPr>
+        <p:spPr>
+          <a:xfrm>
+            <a:off x="209550" y="4154031"/>
+            <a:ext cx="8801100" cy="2246769"/>
+          </a:xfrm>
+          <a:prstGeom prst="rect">
+            <a:avLst/>
+          </a:prstGeom>
+          <a:solidFill>
+            <a:schemeClr val="accent5">
+              <a:lumMod val="40000"/>
+              <a:lumOff val="60000"/>
+              <a:alpha val="15000"/>
+            </a:schemeClr>
+          </a:solidFill>
+          <a:ln w="12700">
+            <a:solidFill>
+              <a:schemeClr val="accent5">
+                <a:lumMod val="60000"/>
+                <a:lumOff val="40000"/>
+              </a:schemeClr>
+            </a:solidFill>
+          </a:ln>
+        </p:spPr>
+        <p:txBody>
+          <a:bodyPr wrap="square">
+            <a:spAutoFit/>
+          </a:bodyPr>
+          <a:lstStyle>
+            <a:lvl1pPr marL="0" indent="0" algn="l" rtl="0" eaLnBrk="0" fontAlgn="base" hangingPunct="0">
+              <a:spcBef>
+                <a:spcPts val="0"/>
+              </a:spcBef>
+              <a:spcAft>
+                <a:spcPct val="0"/>
+              </a:spcAft>
+              <a:buClr>
+                <a:schemeClr val="accent5">
+                  <a:lumMod val="40000"/>
+                  <a:lumOff val="60000"/>
+                </a:schemeClr>
+              </a:buClr>
+              <a:buSzPct val="70000"/>
+              <a:buFont typeface="Wingdings 2" pitchFamily="18" charset="2"/>
+              <a:buNone/>
+              <a:defRPr lang="en-US" sz="2000" b="1" kern="1200" smtClean="0">
+                <a:solidFill>
+                  <a:srgbClr val="8CF4F2"/>
+                </a:solidFill>
+                <a:effectLst>
+                  <a:outerShdw blurRad="38100" dist="38100" dir="2700000" algn="tl">
+                    <a:srgbClr val="000000">
+                      <a:alpha val="43137"/>
+                    </a:srgbClr>
+                  </a:outerShdw>
+                </a:effectLst>
+                <a:latin typeface="Consolas" pitchFamily="49" charset="0"/>
+                <a:ea typeface="+mn-ea"/>
+                <a:cs typeface="Consolas" pitchFamily="49" charset="0"/>
+              </a:defRPr>
+            </a:lvl1pPr>
+            <a:lvl2pPr marL="630238" indent="-273050" algn="l" rtl="0" eaLnBrk="0" fontAlgn="base" hangingPunct="0">
+              <a:spcBef>
+                <a:spcPct val="20000"/>
+              </a:spcBef>
+              <a:spcAft>
+                <a:spcPct val="0"/>
+              </a:spcAft>
+              <a:buClr>
+                <a:schemeClr val="accent2">
+                  <a:lumMod val="60000"/>
+                  <a:lumOff val="40000"/>
+                </a:schemeClr>
+              </a:buClr>
+              <a:buFont typeface="Wingdings 2" pitchFamily="18" charset="2"/>
+              <a:buChar char=""/>
+              <a:defRPr sz="3000" b="1" kern="1200">
+                <a:solidFill>
+                  <a:schemeClr val="tx1">
+                    <a:lumMod val="20000"/>
+                    <a:lumOff val="80000"/>
+                  </a:schemeClr>
+                </a:solidFill>
+                <a:effectLst>
+                  <a:outerShdw blurRad="38100" dist="38100" dir="2700000" algn="tl">
+                    <a:srgbClr val="000000">
+                      <a:alpha val="43137"/>
+                    </a:srgbClr>
+                  </a:outerShdw>
+                </a:effectLst>
+                <a:latin typeface="+mn-lt"/>
+                <a:ea typeface="+mn-ea"/>
+                <a:cs typeface="+mn-cs"/>
+              </a:defRPr>
+            </a:lvl2pPr>
+            <a:lvl3pPr marL="922338" indent="-273050" algn="l" rtl="0" eaLnBrk="0" fontAlgn="base" hangingPunct="0">
+              <a:spcBef>
+                <a:spcPct val="20000"/>
+              </a:spcBef>
+              <a:spcAft>
+                <a:spcPct val="0"/>
+              </a:spcAft>
+              <a:buClr>
+                <a:schemeClr val="tx1">
+                  <a:lumMod val="50000"/>
+                </a:schemeClr>
+              </a:buClr>
+              <a:buFont typeface="Wingdings 2" pitchFamily="18" charset="2"/>
+              <a:buChar char=""/>
+              <a:defRPr sz="2800" b="1" kern="1200">
+                <a:solidFill>
+                  <a:schemeClr val="tx1">
+                    <a:lumMod val="20000"/>
+                    <a:lumOff val="80000"/>
+                  </a:schemeClr>
+                </a:solidFill>
+                <a:effectLst>
+                  <a:outerShdw blurRad="38100" dist="38100" dir="2700000" algn="tl">
+                    <a:srgbClr val="000000">
+                      <a:alpha val="43137"/>
+                    </a:srgbClr>
+                  </a:outerShdw>
+                </a:effectLst>
+                <a:latin typeface="+mn-lt"/>
+                <a:ea typeface="+mn-ea"/>
+                <a:cs typeface="+mn-cs"/>
+              </a:defRPr>
+            </a:lvl3pPr>
+            <a:lvl4pPr marL="1187450" indent="-228600" algn="l" rtl="0" eaLnBrk="0" fontAlgn="base" hangingPunct="0">
+              <a:spcBef>
+                <a:spcPct val="20000"/>
+              </a:spcBef>
+              <a:spcAft>
+                <a:spcPct val="0"/>
+              </a:spcAft>
+              <a:buClr>
+                <a:srgbClr val="F8BD52"/>
+              </a:buClr>
+              <a:buFont typeface="Wingdings 2" pitchFamily="18" charset="2"/>
+              <a:buChar char=""/>
+              <a:defRPr sz="2600" b="1" kern="1200">
+                <a:solidFill>
+                  <a:schemeClr val="tx1">
+                    <a:lumMod val="20000"/>
+                    <a:lumOff val="80000"/>
+                  </a:schemeClr>
+                </a:solidFill>
+                <a:effectLst>
+                  <a:outerShdw blurRad="38100" dist="38100" dir="2700000" algn="tl">
+                    <a:srgbClr val="000000">
+                      <a:alpha val="43137"/>
+                    </a:srgbClr>
+                  </a:outerShdw>
+                </a:effectLst>
+                <a:latin typeface="+mn-lt"/>
+                <a:ea typeface="+mn-ea"/>
+                <a:cs typeface="+mn-cs"/>
+              </a:defRPr>
+            </a:lvl4pPr>
+            <a:lvl5pPr marL="1425575" indent="-228600" algn="l" rtl="0" eaLnBrk="0" fontAlgn="base" hangingPunct="0">
+              <a:spcBef>
+                <a:spcPct val="20000"/>
+              </a:spcBef>
+              <a:spcAft>
+                <a:spcPct val="0"/>
+              </a:spcAft>
+              <a:buClr>
+                <a:srgbClr val="46A6BD"/>
+              </a:buClr>
+              <a:buFont typeface="Wingdings 2" pitchFamily="18" charset="2"/>
+              <a:buChar char=""/>
+              <a:defRPr sz="2400" b="1" kern="1200">
+                <a:solidFill>
+                  <a:schemeClr val="tx1">
+                    <a:lumMod val="20000"/>
+                    <a:lumOff val="80000"/>
+                  </a:schemeClr>
+                </a:solidFill>
+                <a:effectLst>
+                  <a:outerShdw blurRad="38100" dist="38100" dir="2700000" algn="tl">
+                    <a:srgbClr val="000000">
+                      <a:alpha val="43137"/>
+                    </a:srgbClr>
+                  </a:outerShdw>
+                </a:effectLst>
+                <a:latin typeface="+mn-lt"/>
+                <a:ea typeface="+mn-ea"/>
+                <a:cs typeface="+mn-cs"/>
+              </a:defRPr>
+            </a:lvl5pPr>
+            <a:lvl6pPr marL="1673352" indent="-228600" algn="l" rtl="0" eaLnBrk="1" latinLnBrk="0" hangingPunct="1">
+              <a:spcBef>
+                <a:spcPct val="20000"/>
+              </a:spcBef>
+              <a:buClr>
+                <a:schemeClr val="accent6"/>
+              </a:buClr>
+              <a:buFont typeface="Wingdings 2"/>
+              <a:buChar char=""/>
+              <a:defRPr sz="1800" kern="1200">
+                <a:solidFill>
+                  <a:schemeClr val="tx1"/>
+                </a:solidFill>
+                <a:latin typeface="+mn-lt"/>
+                <a:ea typeface="+mn-ea"/>
+                <a:cs typeface="+mn-cs"/>
+              </a:defRPr>
+            </a:lvl6pPr>
+            <a:lvl7pPr marL="1911096" indent="-228600" algn="l" rtl="0" eaLnBrk="1" latinLnBrk="0" hangingPunct="1">
+              <a:spcBef>
+                <a:spcPct val="20000"/>
+              </a:spcBef>
+              <a:buClr>
+                <a:schemeClr val="tx2"/>
+              </a:buClr>
+              <a:buFont typeface="Wingdings 2"/>
+              <a:buChar char=""/>
+              <a:defRPr sz="1600" kern="1200">
+                <a:solidFill>
+                  <a:schemeClr val="tx1"/>
+                </a:solidFill>
+                <a:latin typeface="+mn-lt"/>
+                <a:ea typeface="+mn-ea"/>
+                <a:cs typeface="+mn-cs"/>
+              </a:defRPr>
+            </a:lvl7pPr>
+            <a:lvl8pPr marL="2121408" indent="-182880" algn="l" rtl="0" eaLnBrk="1" latinLnBrk="0" hangingPunct="1">
+              <a:spcBef>
+                <a:spcPct val="20000"/>
+              </a:spcBef>
+              <a:buClr>
+                <a:schemeClr val="tx2"/>
+              </a:buClr>
+              <a:buFont typeface="Wingdings 2"/>
+              <a:buChar char=""/>
+              <a:defRPr sz="1400" kern="1200">
+                <a:solidFill>
+                  <a:schemeClr val="tx1"/>
+                </a:solidFill>
+                <a:latin typeface="+mn-lt"/>
+                <a:ea typeface="+mn-ea"/>
+                <a:cs typeface="+mn-cs"/>
+              </a:defRPr>
+            </a:lvl8pPr>
+            <a:lvl9pPr marL="2322576" indent="-182880" algn="l" rtl="0" eaLnBrk="1" latinLnBrk="0" hangingPunct="1">
+              <a:spcBef>
+                <a:spcPct val="20000"/>
+              </a:spcBef>
+              <a:buClr>
+                <a:schemeClr val="tx2"/>
+              </a:buClr>
+              <a:buFont typeface="Wingdings 2"/>
+              <a:buChar char=""/>
+              <a:defRPr sz="1400" kern="1200">
+                <a:solidFill>
+                  <a:schemeClr val="tx1"/>
+                </a:solidFill>
+                <a:latin typeface="+mn-lt"/>
+                <a:ea typeface="+mn-ea"/>
+                <a:cs typeface="+mn-cs"/>
+              </a:defRPr>
+            </a:lvl9pPr>
+          </a:lstStyle>
+          <a:p>
+            <a:r>
+              <a:rPr lang="en-US" noProof="1"/>
+              <a:t>public static void RegisterBundles(BundleCollection bundles)</a:t>
+            </a:r>
+          </a:p>
+          <a:p>
+            <a:r>
+              <a:rPr lang="en-US" noProof="1"/>
+              <a:t>{</a:t>
+            </a:r>
+          </a:p>
+          <a:p>
+            <a:r>
+              <a:rPr lang="en-US" noProof="1"/>
+              <a:t> </a:t>
+            </a:r>
+            <a:r>
+              <a:rPr lang="en-US" noProof="1" smtClean="0"/>
+              <a:t>   bundles.Add(new </a:t>
+            </a:r>
+            <a:r>
+              <a:rPr lang="en-US" noProof="1"/>
+              <a:t>ScriptBundle</a:t>
+            </a:r>
+            <a:r>
+              <a:rPr lang="en-US" noProof="1"/>
+              <a:t>("~/</a:t>
+            </a:r>
+            <a:r>
+              <a:rPr lang="en-US" noProof="1" smtClean="0"/>
+              <a:t>bundles/jquery").</a:t>
+            </a:r>
+            <a:r>
+              <a:rPr lang="en-US" noProof="1"/>
+              <a:t>Include(</a:t>
+            </a:r>
+          </a:p>
+          <a:p>
+            <a:r>
+              <a:rPr lang="en-US" noProof="1"/>
+              <a:t>                 "~/Scripts/jquery-{version}.</a:t>
+            </a:r>
+            <a:r>
+              <a:rPr lang="en-US" noProof="1"/>
+              <a:t>js</a:t>
+            </a:r>
+            <a:r>
+              <a:rPr lang="en-US" noProof="1" smtClean="0"/>
+              <a:t>"));</a:t>
+            </a:r>
+          </a:p>
+          <a:p>
+            <a:endParaRPr lang="en-US" noProof="1" smtClean="0">
+              <a:solidFill>
+                <a:schemeClr val="tx1"/>
+              </a:solidFill>
+            </a:endParaRPr>
+          </a:p>
+          <a:p>
+            <a:r>
+              <a:rPr lang="en-US" noProof="1">
+                <a:solidFill>
+                  <a:schemeClr val="tx1"/>
+                </a:solidFill>
+              </a:rPr>
+              <a:t> </a:t>
+            </a:r>
+            <a:r>
+              <a:rPr lang="en-US" noProof="1" smtClean="0">
+                <a:solidFill>
+                  <a:schemeClr val="tx1"/>
+                </a:solidFill>
+              </a:rPr>
+              <a:t>   BundleTable.EnableOptimizations </a:t>
+            </a:r>
+            <a:r>
+              <a:rPr lang="en-US" noProof="1">
+                <a:solidFill>
+                  <a:schemeClr val="tx1"/>
+                </a:solidFill>
+              </a:rPr>
+              <a:t>= true;</a:t>
+            </a:r>
+          </a:p>
+          <a:p>
+            <a:r>
+              <a:rPr lang="en-US" noProof="1"/>
+              <a:t>}</a:t>
+            </a:r>
+            <a:endParaRPr lang="en-US" noProof="1"/>
+          </a:p>
+        </p:txBody>
+      </p:sp>
+    </p:spTree>
+    <p:extLst>
+      <p:ext uri="{BB962C8B-B14F-4D97-AF65-F5344CB8AC3E}">
+        <p14:creationId xmlns:p14="http://schemas.microsoft.com/office/powerpoint/2010/main" val="282486192"/>
+      </p:ext>
+    </p:extLst>
+  </p:cSld>
+  <p:clrMapOvr>
+    <a:masterClrMapping/>
+  </p:clrMapOvr>
+</p:sld>
+</file>
+
+<file path=ppt/slides/slide51.xml><?xml version="1.0" encoding="utf-8"?>
+<p:sld xmlns:a="http://schemas.openxmlformats.org/drawingml/2006/main" xmlns:r="http://schemas.openxmlformats.org/officeDocument/2006/relationships" xmlns:p="http://schemas.openxmlformats.org/presentationml/2006/main">
+  <p:cSld>
+    <p:spTree>
+      <p:nvGrpSpPr>
+        <p:cNvPr id="1" name=""/>
+        <p:cNvGrpSpPr/>
+        <p:nvPr/>
+      </p:nvGrpSpPr>
+      <p:grpSpPr>
+        <a:xfrm>
+          <a:off x="0" y="0"/>
+          <a:ext cx="0" cy="0"/>
+          <a:chOff x="0" y="0"/>
+          <a:chExt cx="0" cy="0"/>
+        </a:xfrm>
+      </p:grpSpPr>
+      <p:sp>
+        <p:nvSpPr>
+          <p:cNvPr id="2" name="Title 1"/>
+          <p:cNvSpPr>
+            <a:spLocks noGrp="1"/>
+          </p:cNvSpPr>
+          <p:nvPr>
+            <p:ph type="ctrTitle"/>
+          </p:nvPr>
+        </p:nvSpPr>
+        <p:spPr>
+          <a:xfrm>
+            <a:off x="609600" y="1143000"/>
+            <a:ext cx="7924800" cy="685800"/>
+          </a:xfrm>
+        </p:spPr>
+        <p:txBody>
+          <a:bodyPr/>
+          <a:lstStyle/>
+          <a:p>
+            <a:r>
+              <a:rPr lang="en-US" dirty="0" smtClean="0"/>
+              <a:t>Areas</a:t>
+            </a:r>
+            <a:endParaRPr lang="en-US" dirty="0"/>
+          </a:p>
+        </p:txBody>
+      </p:sp>
+      <p:pic>
+        <p:nvPicPr>
+          <p:cNvPr id="4098" name="Picture 2" descr="http://www.kansas-aa.org/images/area25%20color%20map.JPG"/>
+          <p:cNvPicPr>
+            <a:picLocks noChangeAspect="1" noChangeArrowheads="1"/>
+          </p:cNvPicPr>
+          <p:nvPr/>
+        </p:nvPicPr>
+        <p:blipFill>
+          <a:blip r:embed="rId2">
+            <a:extLst>
+              <a:ext uri="{28A0092B-C50C-407E-A947-70E740481C1C}">
+                <a14:useLocalDpi xmlns:a14="http://schemas.microsoft.com/office/drawing/2010/main" val="0"/>
+              </a:ext>
+            </a:extLst>
+          </a:blip>
+          <a:srcRect/>
+          <a:stretch>
+            <a:fillRect/>
+          </a:stretch>
+        </p:blipFill>
+        <p:spPr bwMode="auto">
+          <a:xfrm>
+            <a:off x="1319212" y="2362200"/>
+            <a:ext cx="6505575" cy="3552825"/>
+          </a:xfrm>
+          <a:prstGeom prst="rect">
+            <a:avLst/>
+          </a:prstGeom>
+          <a:ln>
+            <a:noFill/>
+          </a:ln>
+          <a:effectLst>
+            <a:outerShdw blurRad="190500" algn="tl" rotWithShape="0">
+              <a:srgbClr val="000000">
+                <a:alpha val="70000"/>
+              </a:srgbClr>
+            </a:outerShdw>
+          </a:effectLst>
+          <a:extLst>
+            <a:ext uri="{909E8E84-426E-40DD-AFC4-6F175D3DCCD1}">
+              <a14:hiddenFill xmlns:a14="http://schemas.microsoft.com/office/drawing/2010/main">
+                <a:solidFill>
+                  <a:srgbClr val="FFFFFF"/>
+                </a:solidFill>
+              </a14:hiddenFill>
+            </a:ext>
+          </a:extLst>
+        </p:spPr>
+      </p:pic>
+    </p:spTree>
+    <p:extLst>
+      <p:ext uri="{BB962C8B-B14F-4D97-AF65-F5344CB8AC3E}">
+        <p14:creationId xmlns:p14="http://schemas.microsoft.com/office/powerpoint/2010/main" val="1737583065"/>
+      </p:ext>
+    </p:extLst>
+  </p:cSld>
+  <p:clrMapOvr>
+    <a:masterClrMapping/>
+  </p:clrMapOvr>
+  <p:timing>
+    <p:tnLst>
+      <p:par>
+        <p:cTn id="1" dur="indefinite" restart="never" nodeType="tmRoot"/>
+      </p:par>
+    </p:tnLst>
+  </p:timing>
+</p:sld>
+</file>
+
+<file path=ppt/slides/slide52.xml><?xml version="1.0" encoding="utf-8"?>
+<p:sld xmlns:a="http://schemas.openxmlformats.org/drawingml/2006/main" xmlns:r="http://schemas.openxmlformats.org/officeDocument/2006/relationships" xmlns:p="http://schemas.openxmlformats.org/presentationml/2006/main">
+  <p:cSld>
+    <p:spTree>
+      <p:nvGrpSpPr>
+        <p:cNvPr id="1" name=""/>
+        <p:cNvGrpSpPr/>
+        <p:nvPr/>
+      </p:nvGrpSpPr>
+      <p:grpSpPr>
+        <a:xfrm>
+          <a:off x="0" y="0"/>
+          <a:ext cx="0" cy="0"/>
+          <a:chOff x="0" y="0"/>
+          <a:chExt cx="0" cy="0"/>
+        </a:xfrm>
+      </p:grpSpPr>
+      <p:sp>
+        <p:nvSpPr>
+          <p:cNvPr id="2" name="Title 1"/>
+          <p:cNvSpPr>
+            <a:spLocks noGrp="1"/>
+          </p:cNvSpPr>
+          <p:nvPr>
+            <p:ph type="title"/>
+          </p:nvPr>
+        </p:nvSpPr>
+        <p:spPr/>
+        <p:txBody>
+          <a:bodyPr/>
+          <a:lstStyle/>
+          <a:p>
+            <a:r>
+              <a:rPr lang="en-US" dirty="0" smtClean="0"/>
+              <a:t>Areas</a:t>
+            </a:r>
+            <a:endParaRPr lang="en-US" dirty="0"/>
+          </a:p>
+        </p:txBody>
+      </p:sp>
+      <p:sp>
+        <p:nvSpPr>
+          <p:cNvPr id="3" name="Content Placeholder 2"/>
+          <p:cNvSpPr>
+            <a:spLocks noGrp="1"/>
+          </p:cNvSpPr>
+          <p:nvPr>
+            <p:ph idx="1"/>
+          </p:nvPr>
+        </p:nvSpPr>
+        <p:spPr>
+          <a:xfrm>
+            <a:off x="228600" y="838200"/>
+            <a:ext cx="8686800" cy="5791200"/>
+          </a:xfrm>
+        </p:spPr>
+        <p:txBody>
+          <a:bodyPr/>
+          <a:lstStyle/>
+          <a:p>
+            <a:pPr>
+              <a:spcBef>
+                <a:spcPts val="300"/>
+              </a:spcBef>
+              <a:spcAft>
+                <a:spcPts val="300"/>
+              </a:spcAft>
+            </a:pPr>
+            <a:r>
+              <a:rPr lang="en-US" dirty="0" smtClean="0"/>
+              <a:t>Some </a:t>
+            </a:r>
+            <a:r>
+              <a:rPr lang="en-US" dirty="0"/>
+              <a:t>applications can have a large number of </a:t>
+            </a:r>
+            <a:r>
+              <a:rPr lang="en-US" dirty="0" smtClean="0"/>
+              <a:t>controllers</a:t>
+            </a:r>
+          </a:p>
+          <a:p>
+            <a:pPr>
+              <a:spcBef>
+                <a:spcPts val="300"/>
+              </a:spcBef>
+              <a:spcAft>
+                <a:spcPts val="300"/>
+              </a:spcAft>
+            </a:pPr>
+            <a:r>
+              <a:rPr lang="en-US" dirty="0"/>
+              <a:t>ASP.NET MVC lets </a:t>
+            </a:r>
+            <a:r>
+              <a:rPr lang="en-US" dirty="0" smtClean="0"/>
+              <a:t>us partition </a:t>
+            </a:r>
+            <a:r>
+              <a:rPr lang="en-US" dirty="0"/>
+              <a:t>Web applications into smaller units </a:t>
+            </a:r>
+            <a:r>
+              <a:rPr lang="en-US" dirty="0" smtClean="0"/>
+              <a:t>(areas)</a:t>
+            </a:r>
+          </a:p>
+          <a:p>
+            <a:pPr>
+              <a:spcBef>
+                <a:spcPts val="300"/>
+              </a:spcBef>
+              <a:spcAft>
+                <a:spcPts val="300"/>
+              </a:spcAft>
+            </a:pPr>
+            <a:r>
+              <a:rPr lang="en-US" dirty="0"/>
+              <a:t>An area is effectively an MVC structure inside an </a:t>
+            </a:r>
+            <a:r>
+              <a:rPr lang="en-US" dirty="0" smtClean="0"/>
+              <a:t>application</a:t>
+            </a:r>
+          </a:p>
+          <a:p>
+            <a:pPr>
+              <a:spcBef>
+                <a:spcPts val="300"/>
+              </a:spcBef>
+              <a:spcAft>
+                <a:spcPts val="300"/>
+              </a:spcAft>
+            </a:pPr>
+            <a:r>
+              <a:rPr lang="en-US" dirty="0" smtClean="0"/>
+              <a:t>Example: large e-commerce application</a:t>
+            </a:r>
+          </a:p>
+          <a:p>
+            <a:pPr lvl="1">
+              <a:spcBef>
+                <a:spcPts val="300"/>
+              </a:spcBef>
+              <a:spcAft>
+                <a:spcPts val="300"/>
+              </a:spcAft>
+            </a:pPr>
+            <a:r>
+              <a:rPr lang="en-US" dirty="0" smtClean="0"/>
+              <a:t>Main store, users</a:t>
+            </a:r>
+          </a:p>
+          <a:p>
+            <a:pPr lvl="1">
+              <a:spcBef>
+                <a:spcPts val="300"/>
+              </a:spcBef>
+              <a:spcAft>
+                <a:spcPts val="300"/>
+              </a:spcAft>
+            </a:pPr>
+            <a:r>
+              <a:rPr lang="en-US" dirty="0" smtClean="0"/>
+              <a:t>Blog, forum</a:t>
+            </a:r>
+          </a:p>
+          <a:p>
+            <a:pPr lvl="1">
+              <a:spcBef>
+                <a:spcPts val="300"/>
+              </a:spcBef>
+              <a:spcAft>
+                <a:spcPts val="300"/>
+              </a:spcAft>
+            </a:pPr>
+            <a:r>
+              <a:rPr lang="en-US" dirty="0" smtClean="0"/>
+              <a:t>Administration</a:t>
+            </a:r>
+            <a:endParaRPr lang="en-US" dirty="0"/>
+          </a:p>
+        </p:txBody>
+      </p:sp>
+      <p:sp>
+        <p:nvSpPr>
+          <p:cNvPr id="4" name="Slide Number Placeholder 3"/>
+          <p:cNvSpPr>
+            <a:spLocks noGrp="1"/>
+          </p:cNvSpPr>
+          <p:nvPr>
+            <p:ph type="sldNum" sz="quarter" idx="10"/>
+          </p:nvPr>
+        </p:nvSpPr>
+        <p:spPr/>
+        <p:txBody>
+          <a:bodyPr/>
+          <a:lstStyle/>
+          <a:p>
+            <a:pPr>
+              <a:defRPr/>
+            </a:pPr>
+            <a:fld id="{58452FF4-89E3-4D1B-9927-2DBDC00E58D7}" type="slidenum">
+              <a:rPr lang="en-US" smtClean="0"/>
+              <a:pPr>
+                <a:defRPr/>
+              </a:pPr>
+              <a:t>52</a:t>
+            </a:fld>
+            <a:endParaRPr lang="en-US" dirty="0"/>
+          </a:p>
+        </p:txBody>
+      </p:sp>
+      <p:pic>
+        <p:nvPicPr>
+          <p:cNvPr id="5" name="Picture 4"/>
+          <p:cNvPicPr>
+            <a:picLocks noChangeAspect="1"/>
+          </p:cNvPicPr>
+          <p:nvPr/>
+        </p:nvPicPr>
+        <p:blipFill>
+          <a:blip r:embed="rId2"/>
+          <a:stretch>
+            <a:fillRect/>
+          </a:stretch>
+        </p:blipFill>
+        <p:spPr>
+          <a:xfrm>
+            <a:off x="5486400" y="4953000"/>
+            <a:ext cx="1905000" cy="1387748"/>
+          </a:xfrm>
+          <a:prstGeom prst="round2DiagRect">
+            <a:avLst>
+              <a:gd name="adj1" fmla="val 16667"/>
+              <a:gd name="adj2" fmla="val 0"/>
+            </a:avLst>
+          </a:prstGeom>
+          <a:ln w="88900" cap="sq">
+            <a:solidFill>
+              <a:srgbClr val="FFFFFF"/>
+            </a:solidFill>
+            <a:miter lim="800000"/>
+          </a:ln>
+          <a:effectLst>
+            <a:outerShdw blurRad="254000" algn="tl" rotWithShape="0">
+              <a:srgbClr val="000000">
+                <a:alpha val="43000"/>
+              </a:srgbClr>
+            </a:outerShdw>
+          </a:effectLst>
+        </p:spPr>
+      </p:pic>
+    </p:spTree>
+    <p:extLst>
+      <p:ext uri="{BB962C8B-B14F-4D97-AF65-F5344CB8AC3E}">
+        <p14:creationId xmlns:p14="http://schemas.microsoft.com/office/powerpoint/2010/main" val="645649328"/>
+      </p:ext>
+    </p:extLst>
+  </p:cSld>
+  <p:clrMapOvr>
+    <a:masterClrMapping/>
+  </p:clrMapOvr>
+  <p:timing>
+    <p:tnLst>
+      <p:par>
+        <p:cTn id="1" dur="indefinite" restart="never" nodeType="tmRoot"/>
+      </p:par>
+    </p:tnLst>
+  </p:timing>
+</p:sld>
+</file>
+
+<file path=ppt/slides/slide53.xml><?xml version="1.0" encoding="utf-8"?>
+<p:sld xmlns:a="http://schemas.openxmlformats.org/drawingml/2006/main" xmlns:r="http://schemas.openxmlformats.org/officeDocument/2006/relationships" xmlns:p="http://schemas.openxmlformats.org/presentationml/2006/main">
+  <p:cSld>
+    <p:spTree>
+      <p:nvGrpSpPr>
+        <p:cNvPr id="1" name=""/>
+        <p:cNvGrpSpPr/>
+        <p:nvPr/>
+      </p:nvGrpSpPr>
+      <p:grpSpPr>
+        <a:xfrm>
+          <a:off x="0" y="0"/>
+          <a:ext cx="0" cy="0"/>
+          <a:chOff x="0" y="0"/>
+          <a:chExt cx="0" cy="0"/>
+        </a:xfrm>
+      </p:grpSpPr>
+      <p:sp>
+        <p:nvSpPr>
+          <p:cNvPr id="5" name="Title 4"/>
+          <p:cNvSpPr>
+            <a:spLocks noGrp="1"/>
+          </p:cNvSpPr>
+          <p:nvPr>
+            <p:ph type="ctrTitle"/>
+          </p:nvPr>
+        </p:nvSpPr>
+        <p:spPr>
+          <a:xfrm>
+            <a:off x="609600" y="4953001"/>
+            <a:ext cx="7924800" cy="685800"/>
+          </a:xfrm>
+        </p:spPr>
+        <p:txBody>
+          <a:bodyPr/>
+          <a:lstStyle/>
+          <a:p>
+            <a:r>
+              <a:rPr lang="en-US" dirty="0" smtClean="0"/>
+              <a:t>Live Demo: Areas</a:t>
+            </a:r>
+            <a:endParaRPr lang="en-US" dirty="0"/>
+          </a:p>
+        </p:txBody>
+      </p:sp>
+      <p:sp>
+        <p:nvSpPr>
+          <p:cNvPr id="6" name="Subtitle 5"/>
+          <p:cNvSpPr>
+            <a:spLocks noGrp="1"/>
+          </p:cNvSpPr>
+          <p:nvPr>
+            <p:ph type="subTitle" idx="1"/>
+          </p:nvPr>
+        </p:nvSpPr>
+        <p:spPr>
+          <a:xfrm>
+            <a:off x="1790700" y="5715000"/>
+            <a:ext cx="5562600" cy="457200"/>
+          </a:xfrm>
+        </p:spPr>
+        <p:txBody>
+          <a:bodyPr/>
+          <a:lstStyle/>
+          <a:p>
+            <a:r>
+              <a:rPr lang="en-US" dirty="0" smtClean="0"/>
+              <a:t>ASP.NET MVC structures (areas)</a:t>
+            </a:r>
+            <a:endParaRPr lang="en-US" dirty="0"/>
+          </a:p>
+        </p:txBody>
+      </p:sp>
+      <p:pic>
+        <p:nvPicPr>
+          <p:cNvPr id="4" name="Picture 3"/>
+          <p:cNvPicPr>
+            <a:picLocks noChangeAspect="1"/>
+          </p:cNvPicPr>
+          <p:nvPr/>
+        </p:nvPicPr>
+        <p:blipFill>
+          <a:blip r:embed="rId2"/>
+          <a:stretch>
+            <a:fillRect/>
+          </a:stretch>
+        </p:blipFill>
+        <p:spPr>
+          <a:xfrm>
+            <a:off x="1395412" y="1143000"/>
+            <a:ext cx="6353175" cy="3590925"/>
+          </a:xfrm>
+          <a:prstGeom prst="rect">
+            <a:avLst/>
+          </a:prstGeom>
+          <a:ln>
+            <a:noFill/>
+          </a:ln>
+          <a:effectLst>
+            <a:outerShdw blurRad="190500" algn="tl" rotWithShape="0">
+              <a:srgbClr val="000000">
+                <a:alpha val="70000"/>
+              </a:srgbClr>
+            </a:outerShdw>
+          </a:effectLst>
+        </p:spPr>
+      </p:pic>
+    </p:spTree>
+    <p:extLst>
+      <p:ext uri="{BB962C8B-B14F-4D97-AF65-F5344CB8AC3E}">
+        <p14:creationId xmlns:p14="http://schemas.microsoft.com/office/powerpoint/2010/main" val="2597991593"/>
+      </p:ext>
+    </p:extLst>
+  </p:cSld>
+  <p:clrMapOvr>
+    <a:masterClrMapping/>
+  </p:clrMapOvr>
+  <p:timing>
+    <p:tnLst>
+      <p:par>
+        <p:cTn id="1" dur="indefinite" restart="never" nodeType="tmRoot"/>
+      </p:par>
+    </p:tnLst>
+  </p:timing>
+</p:sld>
+</file>
+
+<file path=ppt/slides/slide54.xml><?xml version="1.0" encoding="utf-8"?>
+<p:sld xmlns:a="http://schemas.openxmlformats.org/drawingml/2006/main" xmlns:r="http://schemas.openxmlformats.org/officeDocument/2006/relationships" xmlns:p="http://schemas.openxmlformats.org/presentationml/2006/main">
+  <p:cSld>
+    <p:spTree>
+      <p:nvGrpSpPr>
+        <p:cNvPr id="1" name=""/>
+        <p:cNvGrpSpPr/>
+        <p:nvPr/>
+      </p:nvGrpSpPr>
+      <p:grpSpPr>
+        <a:xfrm>
+          <a:off x="0" y="0"/>
+          <a:ext cx="0" cy="0"/>
+          <a:chOff x="0" y="0"/>
+          <a:chExt cx="0" cy="0"/>
+        </a:xfrm>
+      </p:grpSpPr>
+      <p:sp>
+        <p:nvSpPr>
+          <p:cNvPr id="2" name="Title 1"/>
+          <p:cNvSpPr>
+            <a:spLocks noGrp="1"/>
+          </p:cNvSpPr>
+          <p:nvPr>
+            <p:ph type="title"/>
+          </p:nvPr>
+        </p:nvSpPr>
         <p:spPr/>
         <p:txBody>
           <a:bodyPr/>
@@ -28508,7 +29875,7 @@
               <a:pPr>
                 <a:defRPr/>
               </a:pPr>
-              <a:t>50</a:t>
+              <a:t>54</a:t>
             </a:fld>
             <a:endParaRPr lang="en-US" dirty="0"/>
           </a:p>
@@ -28534,7 +29901,7 @@
 </p:sld>
 </file>
 
-<file path=ppt/slides/slide51.xml><?xml version="1.0" encoding="utf-8"?>
+<file path=ppt/slides/slide55.xml><?xml version="1.0" encoding="utf-8"?>
 <p:sld xmlns:a="http://schemas.openxmlformats.org/drawingml/2006/main" xmlns:r="http://schemas.openxmlformats.org/officeDocument/2006/relationships" xmlns:p="http://schemas.openxmlformats.org/presentationml/2006/main">
   <p:cSld>
     <p:spTree>
@@ -28634,7 +30001,7 @@
 </p:sld>
 </file>
 
-<file path=ppt/slides/slide52.xml><?xml version="1.0" encoding="utf-8"?>
+<file path=ppt/slides/slide56.xml><?xml version="1.0" encoding="utf-8"?>
 <p:sld xmlns:a="http://schemas.openxmlformats.org/drawingml/2006/main" xmlns:r="http://schemas.openxmlformats.org/officeDocument/2006/relationships" xmlns:p="http://schemas.openxmlformats.org/presentationml/2006/main">
   <p:cSld>
     <p:spTree>
@@ -29097,7 +30464,7 @@
               <a:pPr>
                 <a:defRPr/>
               </a:pPr>
-              <a:t>52</a:t>
+              <a:t>56</a:t>
             </a:fld>
             <a:endParaRPr lang="en-US" dirty="0"/>
           </a:p>

</xml_diff>

<commit_message>
Fixes in ASP.NET MVC Essentials.pptx
</commit_message>
<xml_diff>
--- a/02. ASP.NET-MVC-Essentials/ASP.NET MVC Essentials.pptx
+++ b/02. ASP.NET-MVC-Essentials/ASP.NET MVC Essentials.pptx
@@ -7333,12 +7333,12 @@
           </a:p>
           <a:p>
             <a:r>
-              <a:rPr lang="en-US" dirty="0" smtClean="0"/>
+              <a:rPr lang="en-US" dirty="0"/>
               <a:t>Username: </a:t>
             </a:r>
             <a:r>
               <a:rPr lang="en-US" dirty="0" err="1" smtClean="0"/>
-              <a:t>ivaylo.kenov</a:t>
+              <a:t>NikolayIT</a:t>
             </a:r>
             <a:endParaRPr lang="en-US" dirty="0"/>
           </a:p>
@@ -8724,8 +8724,13 @@
           <a:p>
             <a:r>
               <a:rPr lang="en-US" dirty="0" smtClean="0"/>
-              <a:t>All the constraints are regular expression compatible with class Regex</a:t>
-            </a:r>
+              <a:t>All the constraints are regular expression compatible with </a:t>
+            </a:r>
+            <a:r>
+              <a:rPr lang="en-US" dirty="0" smtClean="0"/>
+              <a:t>the Regex class</a:t>
+            </a:r>
+            <a:endParaRPr lang="en-US" dirty="0" smtClean="0"/>
           </a:p>
           <a:p>
             <a:r>
@@ -8796,7 +8801,7 @@
           </a:xfrm>
           <a:prstGeom prst="roundRect">
             <a:avLst>
-              <a:gd name="adj" fmla="val 8594"/>
+              <a:gd name="adj" fmla="val 2577"/>
             </a:avLst>
           </a:prstGeom>
           <a:solidFill>
@@ -10285,7 +10290,11 @@
           <a:p>
             <a:r>
               <a:rPr lang="en-US" dirty="0" smtClean="0"/>
-              <a:t>Routers instantiate controllers in every request</a:t>
+              <a:t>Routes select controllers </a:t>
+            </a:r>
+            <a:r>
+              <a:rPr lang="en-US" dirty="0" smtClean="0"/>
+              <a:t>in every request</a:t>
             </a:r>
           </a:p>
           <a:p>
@@ -10539,8 +10548,8 @@
         </p:blipFill>
         <p:spPr>
           <a:xfrm>
-            <a:off x="2257425" y="4343400"/>
-            <a:ext cx="4629150" cy="1295400"/>
+            <a:off x="2121273" y="4267200"/>
+            <a:ext cx="4901453" cy="1371600"/>
           </a:xfrm>
           <a:prstGeom prst="roundRect">
             <a:avLst>
@@ -10758,11 +10767,7 @@
             </a:pPr>
             <a:r>
               <a:rPr lang="en-US" dirty="0" smtClean="0"/>
-              <a:t>Partial </a:t>
-            </a:r>
-            <a:r>
-              <a:rPr lang="en-US" dirty="0" smtClean="0"/>
-              <a:t>views</a:t>
+              <a:t>Partial views</a:t>
             </a:r>
             <a:endParaRPr lang="bg-BG" dirty="0" smtClean="0"/>
           </a:p>
@@ -11159,7 +11164,14 @@
               <a:t>Inherits from the base </a:t>
             </a:r>
             <a:r>
-              <a:rPr lang="en-US" dirty="0" err="1"/>
+              <a:rPr lang="en-US" dirty="0" err="1">
+                <a:solidFill>
+                  <a:schemeClr val="accent6">
+                    <a:lumMod val="20000"/>
+                    <a:lumOff val="80000"/>
+                  </a:schemeClr>
+                </a:solidFill>
+              </a:rPr>
               <a:t>ActionResult</a:t>
             </a:r>
             <a:r>
@@ -13596,13 +13608,13 @@
           <p:nvPr>
             <p:extLst>
               <p:ext uri="{D42A27DB-BD31-4B8C-83A1-F6EECF244321}">
-                <p14:modId xmlns:p14="http://schemas.microsoft.com/office/powerpoint/2010/main" val="1077984234"/>
+                <p14:modId xmlns:p14="http://schemas.microsoft.com/office/powerpoint/2010/main" val="3482222777"/>
               </p:ext>
             </p:extLst>
           </p:nvPr>
         </p:nvGraphicFramePr>
         <p:xfrm>
-          <a:off x="609600" y="3662303"/>
+          <a:off x="571500" y="3657600"/>
           <a:ext cx="8001000" cy="2928620"/>
         </p:xfrm>
         <a:graphic>
@@ -13612,8 +13624,8 @@
                 <a:tableStyleId>{073A0DAA-6AF3-43AB-8588-CEC1D06C72B9}</a:tableStyleId>
               </a:tblPr>
               <a:tblGrid>
-                <a:gridCol w="3385037"/>
-                <a:gridCol w="4615963"/>
+                <a:gridCol w="3009550"/>
+                <a:gridCol w="4991450"/>
               </a:tblGrid>
               <a:tr h="412115">
                 <a:tc>
@@ -13707,7 +13719,7 @@
                     <a:lstStyle/>
                     <a:p>
                       <a:r>
-                        <a:rPr lang="en-US" sz="1800" b="0" i="0" u="none" strike="noStrike" kern="1200" baseline="0" dirty="0" err="1" smtClean="0">
+                        <a:rPr lang="en-US" sz="1800" b="1" i="0" u="none" strike="noStrike" kern="1200" baseline="0" dirty="0" err="1" smtClean="0">
                           <a:solidFill>
                             <a:schemeClr val="dk1"/>
                           </a:solidFill>
@@ -13717,7 +13729,7 @@
                         </a:rPr>
                         <a:t>OutputCache</a:t>
                       </a:r>
-                      <a:endParaRPr lang="en-US" sz="1800" b="0" i="0" u="none" strike="noStrike" kern="1200" baseline="0" dirty="0" smtClean="0">
+                      <a:endParaRPr lang="en-US" sz="1800" b="1" i="0" u="none" strike="noStrike" kern="1200" baseline="0" dirty="0" smtClean="0">
                         <a:solidFill>
                           <a:schemeClr val="dk1"/>
                         </a:solidFill>
@@ -13743,8 +13755,27 @@
                           <a:ea typeface="+mn-ea"/>
                           <a:cs typeface="+mn-cs"/>
                         </a:rPr>
-                        <a:t>Cache the output of a controller</a:t>
+                        <a:t>Cache the output of a </a:t>
                       </a:r>
+                      <a:r>
+                        <a:rPr lang="en-US" sz="1800" b="0" i="0" u="none" strike="noStrike" kern="1200" baseline="0" dirty="0" smtClean="0">
+                          <a:solidFill>
+                            <a:schemeClr val="dk1"/>
+                          </a:solidFill>
+                          <a:latin typeface="+mn-lt"/>
+                          <a:ea typeface="+mn-ea"/>
+                          <a:cs typeface="+mn-cs"/>
+                        </a:rPr>
+                        <a:t>controller (action)</a:t>
+                      </a:r>
+                      <a:endParaRPr lang="en-US" sz="1800" b="0" i="0" u="none" strike="noStrike" kern="1200" baseline="0" dirty="0" smtClean="0">
+                        <a:solidFill>
+                          <a:schemeClr val="dk1"/>
+                        </a:solidFill>
+                        <a:latin typeface="+mn-lt"/>
+                        <a:ea typeface="+mn-ea"/>
+                        <a:cs typeface="+mn-cs"/>
+                      </a:endParaRPr>
                     </a:p>
                   </a:txBody>
                   <a:tcPr/>
@@ -13757,7 +13788,7 @@
                     <a:lstStyle/>
                     <a:p>
                       <a:r>
-                        <a:rPr lang="en-US" sz="1800" b="0" i="0" u="none" strike="noStrike" kern="1200" baseline="0" dirty="0" err="1" smtClean="0">
+                        <a:rPr lang="en-US" sz="1800" b="1" i="0" u="none" strike="noStrike" kern="1200" baseline="0" dirty="0" err="1" smtClean="0">
                           <a:solidFill>
                             <a:schemeClr val="dk1"/>
                           </a:solidFill>
@@ -13768,7 +13799,7 @@
                         <a:t>ValidateInput</a:t>
                       </a:r>
                       <a:r>
-                        <a:rPr lang="en-US" sz="1800" b="0" i="0" u="none" strike="noStrike" kern="1200" baseline="0" dirty="0" smtClean="0">
+                        <a:rPr lang="en-US" sz="1800" b="1" i="0" u="none" strike="noStrike" kern="1200" baseline="0" dirty="0" smtClean="0">
                           <a:solidFill>
                             <a:schemeClr val="dk1"/>
                           </a:solidFill>
@@ -13827,7 +13858,7 @@
                         <a:defRPr/>
                       </a:pPr>
                       <a:r>
-                        <a:rPr lang="en-US" sz="1800" b="0" i="0" u="none" strike="noStrike" kern="1200" baseline="0" dirty="0" smtClean="0">
+                        <a:rPr lang="en-US" sz="1800" b="1" i="0" u="none" strike="noStrike" kern="1200" baseline="0" dirty="0" smtClean="0">
                           <a:solidFill>
                             <a:schemeClr val="dk1"/>
                           </a:solidFill>
@@ -13886,7 +13917,7 @@
                         <a:defRPr/>
                       </a:pPr>
                       <a:r>
-                        <a:rPr lang="en-US" sz="1800" b="0" i="0" u="none" strike="noStrike" kern="1200" baseline="0" dirty="0" err="1" smtClean="0">
+                        <a:rPr lang="en-US" sz="1800" b="1" i="0" u="none" strike="noStrike" kern="1200" baseline="0" dirty="0" err="1" smtClean="0">
                           <a:solidFill>
                             <a:schemeClr val="dk1"/>
                           </a:solidFill>
@@ -13896,7 +13927,7 @@
                         </a:rPr>
                         <a:t>ValidateAntiForgeryToken</a:t>
                       </a:r>
-                      <a:endParaRPr lang="en-US" sz="1800" b="0" i="0" u="none" strike="noStrike" kern="1200" baseline="0" dirty="0" smtClean="0">
+                      <a:endParaRPr lang="en-US" sz="1800" b="1" i="0" u="none" strike="noStrike" kern="1200" baseline="0" dirty="0" smtClean="0">
                         <a:solidFill>
                           <a:schemeClr val="dk1"/>
                         </a:solidFill>
@@ -13922,8 +13953,27 @@
                           <a:ea typeface="+mn-ea"/>
                           <a:cs typeface="+mn-cs"/>
                         </a:rPr>
-                        <a:t>Helps prevent cross site request forgeries</a:t>
+                        <a:t>Helps prevent cross site request </a:t>
                       </a:r>
+                      <a:r>
+                        <a:rPr lang="en-US" sz="1800" b="0" i="0" u="none" strike="noStrike" kern="1200" baseline="0" dirty="0" smtClean="0">
+                          <a:solidFill>
+                            <a:schemeClr val="dk1"/>
+                          </a:solidFill>
+                          <a:latin typeface="+mn-lt"/>
+                          <a:ea typeface="+mn-ea"/>
+                          <a:cs typeface="+mn-cs"/>
+                        </a:rPr>
+                        <a:t>forgeries (CSRF)</a:t>
+                      </a:r>
+                      <a:endParaRPr lang="en-US" sz="1800" b="0" i="0" u="none" strike="noStrike" kern="1200" baseline="0" dirty="0" smtClean="0">
+                        <a:solidFill>
+                          <a:schemeClr val="dk1"/>
+                        </a:solidFill>
+                        <a:latin typeface="+mn-lt"/>
+                        <a:ea typeface="+mn-ea"/>
+                        <a:cs typeface="+mn-cs"/>
+                      </a:endParaRPr>
                     </a:p>
                   </a:txBody>
                   <a:tcPr/>
@@ -13936,7 +13986,7 @@
                     <a:lstStyle/>
                     <a:p>
                       <a:r>
-                        <a:rPr lang="en-US" sz="1800" b="0" i="0" u="none" strike="noStrike" kern="1200" baseline="0" dirty="0" err="1" smtClean="0">
+                        <a:rPr lang="en-US" sz="1800" b="1" i="0" u="none" strike="noStrike" kern="1200" baseline="0" dirty="0" err="1" smtClean="0">
                           <a:solidFill>
                             <a:schemeClr val="dk1"/>
                           </a:solidFill>
@@ -13946,7 +13996,7 @@
                         </a:rPr>
                         <a:t>HandleError</a:t>
                       </a:r>
-                      <a:endParaRPr lang="en-US" sz="1800" b="0" i="0" u="none" strike="noStrike" kern="1200" baseline="0" dirty="0" smtClean="0">
+                      <a:endParaRPr lang="en-US" sz="1800" b="1" i="0" u="none" strike="noStrike" kern="1200" baseline="0" dirty="0" smtClean="0">
                         <a:solidFill>
                           <a:schemeClr val="dk1"/>
                         </a:solidFill>
@@ -14300,40 +14350,40 @@
           <a:lstStyle/>
           <a:p>
             <a:r>
-              <a:rPr lang="en-US" b="0" dirty="0"/>
+              <a:rPr lang="en-US" dirty="0"/>
               <a:t>public class </a:t>
             </a:r>
             <a:r>
-              <a:rPr lang="en-US" b="0" dirty="0" err="1"/>
+              <a:rPr lang="en-US" dirty="0" err="1"/>
               <a:t>LogAttribute</a:t>
             </a:r>
             <a:r>
-              <a:rPr lang="en-US" b="0" dirty="0"/>
+              <a:rPr lang="en-US" dirty="0"/>
               <a:t> : </a:t>
             </a:r>
             <a:r>
-              <a:rPr lang="en-US" b="0" dirty="0" err="1" smtClean="0"/>
+              <a:rPr lang="en-US" dirty="0" err="1" smtClean="0"/>
               <a:t>ActionFilterAttribute</a:t>
             </a:r>
-            <a:endParaRPr lang="en-US" b="0" dirty="0" smtClean="0"/>
-          </a:p>
-          <a:p>
-            <a:r>
-              <a:rPr lang="en-US" b="0" dirty="0" smtClean="0"/>
+            <a:endParaRPr lang="en-US" dirty="0" smtClean="0"/>
+          </a:p>
+          <a:p>
+            <a:r>
+              <a:rPr lang="en-US" dirty="0" smtClean="0"/>
               <a:t>{</a:t>
             </a:r>
           </a:p>
           <a:p>
             <a:r>
-              <a:rPr lang="en-US" b="0" dirty="0" smtClean="0"/>
+              <a:rPr lang="en-US" dirty="0" smtClean="0"/>
               <a:t>   public </a:t>
             </a:r>
             <a:r>
-              <a:rPr lang="en-US" b="0" dirty="0"/>
+              <a:rPr lang="en-US" dirty="0"/>
               <a:t>override void </a:t>
             </a:r>
             <a:r>
-              <a:rPr lang="en-US" b="0" dirty="0" err="1" smtClean="0">
+              <a:rPr lang="en-US" dirty="0" err="1" smtClean="0">
                 <a:solidFill>
                   <a:schemeClr val="tx2">
                     <a:lumMod val="20000"/>
@@ -14344,7 +14394,7 @@
               <a:t>OnActionExecuting</a:t>
             </a:r>
             <a:r>
-              <a:rPr lang="en-US" b="0" dirty="0" smtClean="0">
+              <a:rPr lang="en-US" dirty="0" smtClean="0">
                 <a:solidFill>
                   <a:schemeClr val="tx2">
                     <a:lumMod val="20000"/>
@@ -14355,27 +14405,27 @@
               <a:t> </a:t>
             </a:r>
             <a:r>
-              <a:rPr lang="en-US" b="0" dirty="0" smtClean="0"/>
+              <a:rPr lang="en-US" dirty="0" smtClean="0"/>
               <a:t>	(</a:t>
             </a:r>
             <a:r>
-              <a:rPr lang="en-US" b="0" dirty="0" err="1"/>
+              <a:rPr lang="en-US" dirty="0" err="1"/>
               <a:t>ActionExecutingContext</a:t>
             </a:r>
             <a:r>
-              <a:rPr lang="en-US" b="0" dirty="0"/>
+              <a:rPr lang="en-US" dirty="0"/>
               <a:t> </a:t>
             </a:r>
             <a:r>
-              <a:rPr lang="en-US" b="0" dirty="0" err="1"/>
+              <a:rPr lang="en-US" dirty="0" err="1"/>
               <a:t>filterContext</a:t>
             </a:r>
             <a:r>
-              <a:rPr lang="en-US" b="0" dirty="0"/>
+              <a:rPr lang="en-US" dirty="0"/>
               <a:t>) { </a:t>
             </a:r>
             <a:r>
-              <a:rPr lang="en-US" b="0" dirty="0">
+              <a:rPr lang="en-US" dirty="0">
                 <a:solidFill>
                   <a:schemeClr val="accent2">
                     <a:lumMod val="75000"/>
@@ -14385,28 +14435,28 @@
               <a:t>/* */</a:t>
             </a:r>
             <a:r>
-              <a:rPr lang="en-US" b="0" dirty="0"/>
+              <a:rPr lang="en-US" dirty="0"/>
               <a:t> </a:t>
             </a:r>
             <a:r>
-              <a:rPr lang="en-US" b="0" dirty="0" smtClean="0"/>
+              <a:rPr lang="en-US" dirty="0" smtClean="0"/>
               <a:t>}</a:t>
             </a:r>
           </a:p>
           <a:p>
-            <a:endParaRPr lang="en-US" b="0" dirty="0"/>
-          </a:p>
-          <a:p>
-            <a:r>
-              <a:rPr lang="en-US" b="0" dirty="0" smtClean="0"/>
+            <a:endParaRPr lang="en-US" dirty="0"/>
+          </a:p>
+          <a:p>
+            <a:r>
+              <a:rPr lang="en-US" dirty="0" smtClean="0"/>
               <a:t>   public </a:t>
             </a:r>
             <a:r>
-              <a:rPr lang="en-US" b="0" dirty="0"/>
+              <a:rPr lang="en-US" dirty="0"/>
               <a:t>override void </a:t>
             </a:r>
             <a:r>
-              <a:rPr lang="en-US" b="0" dirty="0" err="1" smtClean="0">
+              <a:rPr lang="en-US" dirty="0" err="1" smtClean="0">
                 <a:solidFill>
                   <a:schemeClr val="tx2">
                     <a:lumMod val="20000"/>
@@ -14417,7 +14467,7 @@
               <a:t>OnActionExecuted</a:t>
             </a:r>
             <a:r>
-              <a:rPr lang="en-US" b="0" dirty="0" smtClean="0">
+              <a:rPr lang="en-US" dirty="0" smtClean="0">
                 <a:solidFill>
                   <a:schemeClr val="tx2">
                     <a:lumMod val="20000"/>
@@ -14428,27 +14478,27 @@
               <a:t> </a:t>
             </a:r>
             <a:r>
-              <a:rPr lang="en-US" b="0" dirty="0" smtClean="0"/>
+              <a:rPr lang="en-US" dirty="0" smtClean="0"/>
               <a:t>	(</a:t>
             </a:r>
             <a:r>
-              <a:rPr lang="en-US" b="0" dirty="0" err="1"/>
+              <a:rPr lang="en-US" dirty="0" err="1"/>
               <a:t>ActionExecutedContext</a:t>
             </a:r>
             <a:r>
-              <a:rPr lang="en-US" b="0" dirty="0"/>
+              <a:rPr lang="en-US" dirty="0"/>
               <a:t> </a:t>
             </a:r>
             <a:r>
-              <a:rPr lang="en-US" b="0" dirty="0" err="1"/>
+              <a:rPr lang="en-US" dirty="0" err="1"/>
               <a:t>filterContext</a:t>
             </a:r>
             <a:r>
-              <a:rPr lang="en-US" b="0" dirty="0"/>
+              <a:rPr lang="en-US" dirty="0"/>
               <a:t>) { </a:t>
             </a:r>
             <a:r>
-              <a:rPr lang="en-US" b="0" dirty="0">
+              <a:rPr lang="en-US" dirty="0">
                 <a:solidFill>
                   <a:schemeClr val="accent2">
                     <a:lumMod val="75000"/>
@@ -14458,24 +14508,24 @@
               <a:t>/* */ </a:t>
             </a:r>
             <a:r>
-              <a:rPr lang="en-US" b="0" dirty="0" smtClean="0"/>
+              <a:rPr lang="en-US" dirty="0" smtClean="0"/>
               <a:t>}</a:t>
             </a:r>
           </a:p>
           <a:p>
-            <a:endParaRPr lang="en-US" b="0" dirty="0"/>
-          </a:p>
-          <a:p>
-            <a:r>
-              <a:rPr lang="en-US" b="0" dirty="0" smtClean="0"/>
+            <a:endParaRPr lang="en-US" dirty="0"/>
+          </a:p>
+          <a:p>
+            <a:r>
+              <a:rPr lang="en-US" dirty="0" smtClean="0"/>
               <a:t>   public </a:t>
             </a:r>
             <a:r>
-              <a:rPr lang="en-US" b="0" dirty="0"/>
+              <a:rPr lang="en-US" dirty="0"/>
               <a:t>override void </a:t>
             </a:r>
             <a:r>
-              <a:rPr lang="en-US" b="0" dirty="0" err="1" smtClean="0">
+              <a:rPr lang="en-US" dirty="0" err="1" smtClean="0">
                 <a:solidFill>
                   <a:schemeClr val="tx2">
                     <a:lumMod val="20000"/>
@@ -14486,7 +14536,7 @@
               <a:t>OnResultExecuting</a:t>
             </a:r>
             <a:r>
-              <a:rPr lang="en-US" b="0" dirty="0" smtClean="0">
+              <a:rPr lang="en-US" dirty="0" smtClean="0">
                 <a:solidFill>
                   <a:schemeClr val="tx2">
                     <a:lumMod val="20000"/>
@@ -14497,27 +14547,27 @@
               <a:t> </a:t>
             </a:r>
             <a:r>
-              <a:rPr lang="en-US" b="0" dirty="0" smtClean="0"/>
+              <a:rPr lang="en-US" dirty="0" smtClean="0"/>
               <a:t>	(</a:t>
             </a:r>
             <a:r>
-              <a:rPr lang="en-US" b="0" dirty="0" err="1"/>
+              <a:rPr lang="en-US" dirty="0" err="1"/>
               <a:t>ResultExecutingContext</a:t>
             </a:r>
             <a:r>
-              <a:rPr lang="en-US" b="0" dirty="0"/>
+              <a:rPr lang="en-US" dirty="0"/>
               <a:t> </a:t>
             </a:r>
             <a:r>
-              <a:rPr lang="en-US" b="0" dirty="0" err="1"/>
+              <a:rPr lang="en-US" dirty="0" err="1"/>
               <a:t>filterContext</a:t>
             </a:r>
             <a:r>
-              <a:rPr lang="en-US" b="0" dirty="0"/>
+              <a:rPr lang="en-US" dirty="0"/>
               <a:t>) { </a:t>
             </a:r>
             <a:r>
-              <a:rPr lang="en-US" b="0" dirty="0">
+              <a:rPr lang="en-US" dirty="0">
                 <a:solidFill>
                   <a:schemeClr val="accent2">
                     <a:lumMod val="75000"/>
@@ -14527,24 +14577,24 @@
               <a:t>/* */ </a:t>
             </a:r>
             <a:r>
-              <a:rPr lang="en-US" b="0" dirty="0" smtClean="0"/>
+              <a:rPr lang="en-US" dirty="0" smtClean="0"/>
               <a:t>}</a:t>
             </a:r>
           </a:p>
           <a:p>
-            <a:endParaRPr lang="en-US" b="0" dirty="0"/>
-          </a:p>
-          <a:p>
-            <a:r>
-              <a:rPr lang="en-US" b="0" dirty="0" smtClean="0"/>
+            <a:endParaRPr lang="en-US" dirty="0"/>
+          </a:p>
+          <a:p>
+            <a:r>
+              <a:rPr lang="en-US" dirty="0" smtClean="0"/>
               <a:t>   public </a:t>
             </a:r>
             <a:r>
-              <a:rPr lang="en-US" b="0" dirty="0"/>
+              <a:rPr lang="en-US" dirty="0"/>
               <a:t>override void </a:t>
             </a:r>
             <a:r>
-              <a:rPr lang="en-US" b="0" dirty="0" err="1" smtClean="0">
+              <a:rPr lang="en-US" dirty="0" err="1" smtClean="0">
                 <a:solidFill>
                   <a:schemeClr val="tx2">
                     <a:lumMod val="20000"/>
@@ -14555,7 +14605,7 @@
               <a:t>OnResultExecuted</a:t>
             </a:r>
             <a:r>
-              <a:rPr lang="en-US" b="0" dirty="0" smtClean="0">
+              <a:rPr lang="en-US" dirty="0" smtClean="0">
                 <a:solidFill>
                   <a:schemeClr val="tx2">
                     <a:lumMod val="20000"/>
@@ -14566,27 +14616,27 @@
               <a:t> </a:t>
             </a:r>
             <a:r>
-              <a:rPr lang="en-US" b="0" dirty="0" smtClean="0"/>
+              <a:rPr lang="en-US" dirty="0" smtClean="0"/>
               <a:t>	(</a:t>
             </a:r>
             <a:r>
-              <a:rPr lang="en-US" b="0" dirty="0" err="1"/>
+              <a:rPr lang="en-US" dirty="0" err="1"/>
               <a:t>ResultExecutedContext</a:t>
             </a:r>
             <a:r>
-              <a:rPr lang="en-US" b="0" dirty="0"/>
+              <a:rPr lang="en-US" dirty="0"/>
               <a:t> </a:t>
             </a:r>
             <a:r>
-              <a:rPr lang="en-US" b="0" dirty="0" err="1"/>
+              <a:rPr lang="en-US" dirty="0" err="1"/>
               <a:t>filterContext</a:t>
             </a:r>
             <a:r>
-              <a:rPr lang="en-US" b="0" dirty="0"/>
+              <a:rPr lang="en-US" dirty="0"/>
               <a:t>) { </a:t>
             </a:r>
             <a:r>
-              <a:rPr lang="en-US" b="0" dirty="0">
+              <a:rPr lang="en-US" dirty="0">
                 <a:solidFill>
                   <a:schemeClr val="accent2">
                     <a:lumMod val="75000"/>
@@ -14596,13 +14646,13 @@
               <a:t>/* */ </a:t>
             </a:r>
             <a:r>
-              <a:rPr lang="en-US" b="0" dirty="0" smtClean="0"/>
+              <a:rPr lang="en-US" dirty="0" smtClean="0"/>
               <a:t>}</a:t>
             </a:r>
           </a:p>
           <a:p>
             <a:r>
-              <a:rPr lang="en-US" b="0" dirty="0" smtClean="0"/>
+              <a:rPr lang="en-US" dirty="0" smtClean="0"/>
               <a:t>}</a:t>
             </a:r>
             <a:endParaRPr lang="en-US" dirty="0"/>
@@ -14911,7 +14961,7 @@
           </a:lstStyle>
           <a:p>
             <a:r>
-              <a:rPr lang="en-US" b="0" dirty="0">
+              <a:rPr lang="en-US" dirty="0">
                 <a:solidFill>
                   <a:schemeClr val="tx2">
                     <a:lumMod val="20000"/>
@@ -14922,7 +14972,7 @@
               <a:t>[</a:t>
             </a:r>
             <a:r>
-              <a:rPr lang="en-US" b="0" dirty="0" smtClean="0">
+              <a:rPr lang="en-US" dirty="0" smtClean="0">
                 <a:solidFill>
                   <a:schemeClr val="tx2">
                     <a:lumMod val="20000"/>
@@ -14935,23 +14985,23 @@
           </a:p>
           <a:p>
             <a:r>
-              <a:rPr lang="en-US" b="0" dirty="0" smtClean="0"/>
+              <a:rPr lang="en-US" dirty="0" smtClean="0"/>
               <a:t>public </a:t>
             </a:r>
             <a:r>
-              <a:rPr lang="en-US" b="0" dirty="0"/>
+              <a:rPr lang="en-US" dirty="0"/>
               <a:t>class </a:t>
             </a:r>
             <a:r>
-              <a:rPr lang="en-US" b="0" dirty="0" err="1"/>
+              <a:rPr lang="en-US" dirty="0" err="1"/>
               <a:t>DepartmentController</a:t>
             </a:r>
             <a:r>
-              <a:rPr lang="en-US" b="0" dirty="0"/>
+              <a:rPr lang="en-US" dirty="0"/>
               <a:t> : Controller { </a:t>
             </a:r>
             <a:r>
-              <a:rPr lang="en-US" b="0" dirty="0">
+              <a:rPr lang="en-US" dirty="0">
                 <a:solidFill>
                   <a:schemeClr val="accent2">
                     <a:lumMod val="75000"/>
@@ -14961,10 +15011,9 @@
               <a:t>// ...</a:t>
             </a:r>
             <a:r>
-              <a:rPr lang="en-US" b="0" dirty="0"/>
+              <a:rPr lang="en-US" dirty="0"/>
               <a:t> } </a:t>
             </a:r>
-            <a:endParaRPr lang="en-US" dirty="0"/>
           </a:p>
         </p:txBody>
       </p:sp>
@@ -29160,11 +29209,7 @@
             </a:r>
             <a:r>
               <a:rPr lang="en-US" noProof="1"/>
-              <a:t>ScriptBundle</a:t>
-            </a:r>
-            <a:r>
-              <a:rPr lang="en-US" noProof="1"/>
-              <a:t>("~/</a:t>
+              <a:t>ScriptBundle("~/</a:t>
             </a:r>
             <a:r>
               <a:rPr lang="en-US" noProof="1" smtClean="0"/>
@@ -29178,11 +29223,7 @@
           <a:p>
             <a:r>
               <a:rPr lang="en-US" noProof="1"/>
-              <a:t>                 "~/Scripts/jquery-{version}.</a:t>
-            </a:r>
-            <a:r>
-              <a:rPr lang="en-US" noProof="1"/>
-              <a:t>js</a:t>
+              <a:t>                 "~/Scripts/jquery-{version}.js</a:t>
             </a:r>
             <a:r>
               <a:rPr lang="en-US" noProof="1" smtClean="0"/>
@@ -29227,7 +29268,6 @@
               <a:rPr lang="en-US" noProof="1"/>
               <a:t>}</a:t>
             </a:r>
-            <a:endParaRPr lang="en-US" noProof="1"/>
           </a:p>
         </p:txBody>
       </p:sp>

</xml_diff>